<commit_message>
polished the presentation slide
</commit_message>
<xml_diff>
--- a/ESTR4999_Notes/ESTR4999_Presentation.pptx
+++ b/ESTR4999_Notes/ESTR4999_Presentation.pptx
@@ -5,7 +5,7 @@
     <p:sldMasterId id="2147483648" r:id="rId1"/>
   </p:sldMasterIdLst>
   <p:notesMasterIdLst>
-    <p:notesMasterId r:id="rId18"/>
+    <p:notesMasterId r:id="rId19"/>
   </p:notesMasterIdLst>
   <p:sldIdLst>
     <p:sldId id="256" r:id="rId2"/>
@@ -13,17 +13,18 @@
     <p:sldId id="260" r:id="rId4"/>
     <p:sldId id="262" r:id="rId5"/>
     <p:sldId id="263" r:id="rId6"/>
-    <p:sldId id="259" r:id="rId7"/>
-    <p:sldId id="261" r:id="rId8"/>
-    <p:sldId id="264" r:id="rId9"/>
-    <p:sldId id="268" r:id="rId10"/>
-    <p:sldId id="265" r:id="rId11"/>
-    <p:sldId id="266" r:id="rId12"/>
-    <p:sldId id="267" r:id="rId13"/>
-    <p:sldId id="269" r:id="rId14"/>
-    <p:sldId id="270" r:id="rId15"/>
-    <p:sldId id="271" r:id="rId16"/>
-    <p:sldId id="272" r:id="rId17"/>
+    <p:sldId id="273" r:id="rId7"/>
+    <p:sldId id="259" r:id="rId8"/>
+    <p:sldId id="261" r:id="rId9"/>
+    <p:sldId id="264" r:id="rId10"/>
+    <p:sldId id="268" r:id="rId11"/>
+    <p:sldId id="265" r:id="rId12"/>
+    <p:sldId id="266" r:id="rId13"/>
+    <p:sldId id="267" r:id="rId14"/>
+    <p:sldId id="269" r:id="rId15"/>
+    <p:sldId id="270" r:id="rId16"/>
+    <p:sldId id="271" r:id="rId17"/>
+    <p:sldId id="272" r:id="rId18"/>
   </p:sldIdLst>
   <p:sldSz cx="12192000" cy="6858000"/>
   <p:notesSz cx="6858000" cy="9144000"/>
@@ -544,7 +545,7 @@
           <a:p>
             <a:fld id="{C8FE534B-9E53-2C41-99F8-577F50FB7840}" type="slidenum">
               <a:rPr kumimoji="1" lang="zh-TW" altLang="en-US" smtClean="0"/>
-              <a:t>6</a:t>
+              <a:t>7</a:t>
             </a:fld>
             <a:endParaRPr kumimoji="1" lang="zh-TW" altLang="en-US"/>
           </a:p>
@@ -708,9 +709,9 @@
           <a:bodyPr/>
           <a:lstStyle/>
           <a:p>
-            <a:fld id="{7FDDC6AA-96B8-3D44-8022-0838F1FEEFFE}" type="datetimeFigureOut">
+            <a:fld id="{25756661-A71E-5B48-ACA3-5BF45D74A230}" type="datetime1">
               <a:rPr kumimoji="1" lang="zh-TW" altLang="en-US" smtClean="0"/>
-              <a:t>2022/4/25</a:t>
+              <a:t>2022/4/26</a:t>
             </a:fld>
             <a:endParaRPr kumimoji="1" lang="zh-TW" altLang="en-US"/>
           </a:p>
@@ -906,9 +907,9 @@
           <a:bodyPr/>
           <a:lstStyle/>
           <a:p>
-            <a:fld id="{7FDDC6AA-96B8-3D44-8022-0838F1FEEFFE}" type="datetimeFigureOut">
+            <a:fld id="{F5A194D8-B59B-7346-9076-D8D64A5FED57}" type="datetime1">
               <a:rPr kumimoji="1" lang="zh-TW" altLang="en-US" smtClean="0"/>
-              <a:t>2022/4/25</a:t>
+              <a:t>2022/4/26</a:t>
             </a:fld>
             <a:endParaRPr kumimoji="1" lang="zh-TW" altLang="en-US"/>
           </a:p>
@@ -1114,9 +1115,9 @@
           <a:bodyPr/>
           <a:lstStyle/>
           <a:p>
-            <a:fld id="{7FDDC6AA-96B8-3D44-8022-0838F1FEEFFE}" type="datetimeFigureOut">
+            <a:fld id="{093AB554-44A8-6749-8C6D-237994429B81}" type="datetime1">
               <a:rPr kumimoji="1" lang="zh-TW" altLang="en-US" smtClean="0"/>
-              <a:t>2022/4/25</a:t>
+              <a:t>2022/4/26</a:t>
             </a:fld>
             <a:endParaRPr kumimoji="1" lang="zh-TW" altLang="en-US"/>
           </a:p>
@@ -1312,9 +1313,9 @@
           <a:bodyPr/>
           <a:lstStyle/>
           <a:p>
-            <a:fld id="{7FDDC6AA-96B8-3D44-8022-0838F1FEEFFE}" type="datetimeFigureOut">
+            <a:fld id="{34965F7F-013B-8240-B945-073682FC974F}" type="datetime1">
               <a:rPr kumimoji="1" lang="zh-TW" altLang="en-US" smtClean="0"/>
-              <a:t>2022/4/25</a:t>
+              <a:t>2022/4/26</a:t>
             </a:fld>
             <a:endParaRPr kumimoji="1" lang="zh-TW" altLang="en-US"/>
           </a:p>
@@ -1587,9 +1588,9 @@
           <a:bodyPr/>
           <a:lstStyle/>
           <a:p>
-            <a:fld id="{7FDDC6AA-96B8-3D44-8022-0838F1FEEFFE}" type="datetimeFigureOut">
+            <a:fld id="{3BCF5FC9-A46A-6147-AEF6-203B216D5947}" type="datetime1">
               <a:rPr kumimoji="1" lang="zh-TW" altLang="en-US" smtClean="0"/>
-              <a:t>2022/4/25</a:t>
+              <a:t>2022/4/26</a:t>
             </a:fld>
             <a:endParaRPr kumimoji="1" lang="zh-TW" altLang="en-US"/>
           </a:p>
@@ -1852,9 +1853,9 @@
           <a:bodyPr/>
           <a:lstStyle/>
           <a:p>
-            <a:fld id="{7FDDC6AA-96B8-3D44-8022-0838F1FEEFFE}" type="datetimeFigureOut">
+            <a:fld id="{39F9A81A-DAF5-E24D-ABA5-A3F878D60B3E}" type="datetime1">
               <a:rPr kumimoji="1" lang="zh-TW" altLang="en-US" smtClean="0"/>
-              <a:t>2022/4/25</a:t>
+              <a:t>2022/4/26</a:t>
             </a:fld>
             <a:endParaRPr kumimoji="1" lang="zh-TW" altLang="en-US"/>
           </a:p>
@@ -2264,9 +2265,9 @@
           <a:bodyPr/>
           <a:lstStyle/>
           <a:p>
-            <a:fld id="{7FDDC6AA-96B8-3D44-8022-0838F1FEEFFE}" type="datetimeFigureOut">
+            <a:fld id="{1142353C-9663-6B40-A21E-8402AB254020}" type="datetime1">
               <a:rPr kumimoji="1" lang="zh-TW" altLang="en-US" smtClean="0"/>
-              <a:t>2022/4/25</a:t>
+              <a:t>2022/4/26</a:t>
             </a:fld>
             <a:endParaRPr kumimoji="1" lang="zh-TW" altLang="en-US"/>
           </a:p>
@@ -2405,9 +2406,9 @@
           <a:bodyPr/>
           <a:lstStyle/>
           <a:p>
-            <a:fld id="{7FDDC6AA-96B8-3D44-8022-0838F1FEEFFE}" type="datetimeFigureOut">
+            <a:fld id="{83AE2B6D-CC27-6042-BADD-1D8ACCE8E3BC}" type="datetime1">
               <a:rPr kumimoji="1" lang="zh-TW" altLang="en-US" smtClean="0"/>
-              <a:t>2022/4/25</a:t>
+              <a:t>2022/4/26</a:t>
             </a:fld>
             <a:endParaRPr kumimoji="1" lang="zh-TW" altLang="en-US"/>
           </a:p>
@@ -2518,9 +2519,9 @@
           <a:bodyPr/>
           <a:lstStyle/>
           <a:p>
-            <a:fld id="{7FDDC6AA-96B8-3D44-8022-0838F1FEEFFE}" type="datetimeFigureOut">
+            <a:fld id="{3962EFF0-E8BB-324C-BAFE-6C5F88F3DE42}" type="datetime1">
               <a:rPr kumimoji="1" lang="zh-TW" altLang="en-US" smtClean="0"/>
-              <a:t>2022/4/25</a:t>
+              <a:t>2022/4/26</a:t>
             </a:fld>
             <a:endParaRPr kumimoji="1" lang="zh-TW" altLang="en-US"/>
           </a:p>
@@ -2829,9 +2830,9 @@
           <a:bodyPr/>
           <a:lstStyle/>
           <a:p>
-            <a:fld id="{7FDDC6AA-96B8-3D44-8022-0838F1FEEFFE}" type="datetimeFigureOut">
+            <a:fld id="{AB6347C7-FD74-D94A-9C09-EC380A6F657C}" type="datetime1">
               <a:rPr kumimoji="1" lang="zh-TW" altLang="en-US" smtClean="0"/>
-              <a:t>2022/4/25</a:t>
+              <a:t>2022/4/26</a:t>
             </a:fld>
             <a:endParaRPr kumimoji="1" lang="zh-TW" altLang="en-US"/>
           </a:p>
@@ -3117,9 +3118,9 @@
           <a:bodyPr/>
           <a:lstStyle/>
           <a:p>
-            <a:fld id="{7FDDC6AA-96B8-3D44-8022-0838F1FEEFFE}" type="datetimeFigureOut">
+            <a:fld id="{DC4C3161-75DC-D440-B170-555BC512478C}" type="datetime1">
               <a:rPr kumimoji="1" lang="zh-TW" altLang="en-US" smtClean="0"/>
-              <a:t>2022/4/25</a:t>
+              <a:t>2022/4/26</a:t>
             </a:fld>
             <a:endParaRPr kumimoji="1" lang="zh-TW" altLang="en-US"/>
           </a:p>
@@ -3358,9 +3359,9 @@
             </a:lvl1pPr>
           </a:lstStyle>
           <a:p>
-            <a:fld id="{7FDDC6AA-96B8-3D44-8022-0838F1FEEFFE}" type="datetimeFigureOut">
+            <a:fld id="{ECD2A1A2-7A04-AF47-9D00-6F6FB3C6DB90}" type="datetime1">
               <a:rPr kumimoji="1" lang="zh-TW" altLang="en-US" smtClean="0"/>
-              <a:t>2022/4/25</a:t>
+              <a:t>2022/4/26</a:t>
             </a:fld>
             <a:endParaRPr kumimoji="1" lang="zh-TW" altLang="en-US"/>
           </a:p>
@@ -3477,6 +3478,7 @@
     <p:sldLayoutId id="2147483658" r:id="rId10"/>
     <p:sldLayoutId id="2147483659" r:id="rId11"/>
   </p:sldLayoutIdLst>
+  <p:hf hdr="0" ftr="0" dt="0"/>
   <p:txStyles>
     <p:titleStyle>
       <a:lvl1pPr algn="l" defTabSz="914400" rtl="0" eaLnBrk="1" latinLnBrk="0" hangingPunct="1">
@@ -4006,6 +4008,35 @@
           </a:p>
         </p:txBody>
       </p:sp>
+      <p:sp>
+        <p:nvSpPr>
+          <p:cNvPr id="2" name="投影片編號版面配置區 1">
+            <a:extLst>
+              <a:ext uri="{FF2B5EF4-FFF2-40B4-BE49-F238E27FC236}">
+                <a16:creationId xmlns:a16="http://schemas.microsoft.com/office/drawing/2014/main" id="{E319D580-D0FC-260E-0F0A-A1DB9E2D99B3}"/>
+              </a:ext>
+            </a:extLst>
+          </p:cNvPr>
+          <p:cNvSpPr>
+            <a:spLocks noGrp="1"/>
+          </p:cNvSpPr>
+          <p:nvPr>
+            <p:ph type="sldNum" sz="quarter" idx="12"/>
+          </p:nvPr>
+        </p:nvSpPr>
+        <p:spPr/>
+        <p:txBody>
+          <a:bodyPr/>
+          <a:lstStyle/>
+          <a:p>
+            <a:fld id="{EBC81C9E-5C6F-BE43-A2DB-9F7FDEA567D5}" type="slidenum">
+              <a:rPr kumimoji="1" lang="zh-TW" altLang="en-US" smtClean="0"/>
+              <a:t>1</a:t>
+            </a:fld>
+            <a:endParaRPr kumimoji="1" lang="zh-TW" altLang="en-US"/>
+          </a:p>
+        </p:txBody>
+      </p:sp>
     </p:spTree>
     <p:extLst>
       <p:ext uri="{BB962C8B-B14F-4D97-AF65-F5344CB8AC3E}">
@@ -4020,6 +4051,691 @@
 </file>
 
 <file path=ppt/slides/slide10.xml><?xml version="1.0" encoding="utf-8"?>
+<p:sld xmlns:a="http://schemas.openxmlformats.org/drawingml/2006/main" xmlns:r="http://schemas.openxmlformats.org/officeDocument/2006/relationships" xmlns:p="http://schemas.openxmlformats.org/presentationml/2006/main">
+  <p:cSld>
+    <p:spTree>
+      <p:nvGrpSpPr>
+        <p:cNvPr id="1" name=""/>
+        <p:cNvGrpSpPr/>
+        <p:nvPr/>
+      </p:nvGrpSpPr>
+      <p:grpSpPr>
+        <a:xfrm>
+          <a:off x="0" y="0"/>
+          <a:ext cx="0" cy="0"/>
+          <a:chOff x="0" y="0"/>
+          <a:chExt cx="0" cy="0"/>
+        </a:xfrm>
+      </p:grpSpPr>
+      <p:pic>
+        <p:nvPicPr>
+          <p:cNvPr id="15" name="圖片 14">
+            <a:extLst>
+              <a:ext uri="{FF2B5EF4-FFF2-40B4-BE49-F238E27FC236}">
+                <a16:creationId xmlns:a16="http://schemas.microsoft.com/office/drawing/2014/main" id="{69E76F6F-B539-6722-980A-B4910004E210}"/>
+              </a:ext>
+            </a:extLst>
+          </p:cNvPr>
+          <p:cNvPicPr>
+            <a:picLocks noChangeAspect="1"/>
+          </p:cNvPicPr>
+          <p:nvPr/>
+        </p:nvPicPr>
+        <p:blipFill>
+          <a:blip r:embed="rId2"/>
+          <a:stretch>
+            <a:fillRect/>
+          </a:stretch>
+        </p:blipFill>
+        <p:spPr>
+          <a:xfrm>
+            <a:off x="577088" y="1694181"/>
+            <a:ext cx="5424932" cy="4122558"/>
+          </a:xfrm>
+          <a:prstGeom prst="rect">
+            <a:avLst/>
+          </a:prstGeom>
+        </p:spPr>
+      </p:pic>
+      <p:pic>
+        <p:nvPicPr>
+          <p:cNvPr id="17" name="圖片 16">
+            <a:extLst>
+              <a:ext uri="{FF2B5EF4-FFF2-40B4-BE49-F238E27FC236}">
+                <a16:creationId xmlns:a16="http://schemas.microsoft.com/office/drawing/2014/main" id="{9D38A8B0-C3D6-5461-043E-DDA3310D2DCB}"/>
+              </a:ext>
+            </a:extLst>
+          </p:cNvPr>
+          <p:cNvPicPr>
+            <a:picLocks noChangeAspect="1"/>
+          </p:cNvPicPr>
+          <p:nvPr/>
+        </p:nvPicPr>
+        <p:blipFill>
+          <a:blip r:embed="rId3"/>
+          <a:stretch>
+            <a:fillRect/>
+          </a:stretch>
+        </p:blipFill>
+        <p:spPr>
+          <a:xfrm>
+            <a:off x="6120384" y="1743805"/>
+            <a:ext cx="5424932" cy="4056392"/>
+          </a:xfrm>
+          <a:prstGeom prst="rect">
+            <a:avLst/>
+          </a:prstGeom>
+        </p:spPr>
+      </p:pic>
+      <p:sp>
+        <p:nvSpPr>
+          <p:cNvPr id="18" name="內容版面配置區 2">
+            <a:extLst>
+              <a:ext uri="{FF2B5EF4-FFF2-40B4-BE49-F238E27FC236}">
+                <a16:creationId xmlns:a16="http://schemas.microsoft.com/office/drawing/2014/main" id="{57A183A6-C359-ABFA-76DC-BAF2CF96DD56}"/>
+              </a:ext>
+            </a:extLst>
+          </p:cNvPr>
+          <p:cNvSpPr txBox="1">
+            <a:spLocks/>
+          </p:cNvSpPr>
+          <p:nvPr/>
+        </p:nvSpPr>
+        <p:spPr>
+          <a:xfrm>
+            <a:off x="808736" y="5662299"/>
+            <a:ext cx="5287264" cy="376797"/>
+          </a:xfrm>
+          <a:prstGeom prst="rect">
+            <a:avLst/>
+          </a:prstGeom>
+        </p:spPr>
+        <p:txBody>
+          <a:bodyPr vert="horz" lIns="91440" tIns="45720" rIns="91440" bIns="45720" rtlCol="0">
+            <a:noAutofit/>
+          </a:bodyPr>
+          <a:lstStyle>
+            <a:lvl1pPr marL="228600" indent="-228600" algn="l" defTabSz="914400" rtl="0" eaLnBrk="1" latinLnBrk="0" hangingPunct="1">
+              <a:lnSpc>
+                <a:spcPct val="90000"/>
+              </a:lnSpc>
+              <a:spcBef>
+                <a:spcPts val="1000"/>
+              </a:spcBef>
+              <a:buFont typeface="Arial" panose="020B0604020202020204" pitchFamily="34" charset="0"/>
+              <a:buChar char="•"/>
+              <a:defRPr sz="2800" kern="1200">
+                <a:solidFill>
+                  <a:schemeClr val="tx1"/>
+                </a:solidFill>
+                <a:latin typeface="+mn-lt"/>
+                <a:ea typeface="+mn-ea"/>
+                <a:cs typeface="+mn-cs"/>
+              </a:defRPr>
+            </a:lvl1pPr>
+            <a:lvl2pPr marL="685800" indent="-228600" algn="l" defTabSz="914400" rtl="0" eaLnBrk="1" latinLnBrk="0" hangingPunct="1">
+              <a:lnSpc>
+                <a:spcPct val="90000"/>
+              </a:lnSpc>
+              <a:spcBef>
+                <a:spcPts val="500"/>
+              </a:spcBef>
+              <a:buFont typeface="Arial" panose="020B0604020202020204" pitchFamily="34" charset="0"/>
+              <a:buChar char="•"/>
+              <a:defRPr sz="2400" kern="1200">
+                <a:solidFill>
+                  <a:schemeClr val="tx1"/>
+                </a:solidFill>
+                <a:latin typeface="+mn-lt"/>
+                <a:ea typeface="+mn-ea"/>
+                <a:cs typeface="+mn-cs"/>
+              </a:defRPr>
+            </a:lvl2pPr>
+            <a:lvl3pPr marL="1143000" indent="-228600" algn="l" defTabSz="914400" rtl="0" eaLnBrk="1" latinLnBrk="0" hangingPunct="1">
+              <a:lnSpc>
+                <a:spcPct val="90000"/>
+              </a:lnSpc>
+              <a:spcBef>
+                <a:spcPts val="500"/>
+              </a:spcBef>
+              <a:buFont typeface="Arial" panose="020B0604020202020204" pitchFamily="34" charset="0"/>
+              <a:buChar char="•"/>
+              <a:defRPr sz="2000" kern="1200">
+                <a:solidFill>
+                  <a:schemeClr val="tx1"/>
+                </a:solidFill>
+                <a:latin typeface="+mn-lt"/>
+                <a:ea typeface="+mn-ea"/>
+                <a:cs typeface="+mn-cs"/>
+              </a:defRPr>
+            </a:lvl3pPr>
+            <a:lvl4pPr marL="1600200" indent="-228600" algn="l" defTabSz="914400" rtl="0" eaLnBrk="1" latinLnBrk="0" hangingPunct="1">
+              <a:lnSpc>
+                <a:spcPct val="90000"/>
+              </a:lnSpc>
+              <a:spcBef>
+                <a:spcPts val="500"/>
+              </a:spcBef>
+              <a:buFont typeface="Arial" panose="020B0604020202020204" pitchFamily="34" charset="0"/>
+              <a:buChar char="•"/>
+              <a:defRPr sz="1800" kern="1200">
+                <a:solidFill>
+                  <a:schemeClr val="tx1"/>
+                </a:solidFill>
+                <a:latin typeface="+mn-lt"/>
+                <a:ea typeface="+mn-ea"/>
+                <a:cs typeface="+mn-cs"/>
+              </a:defRPr>
+            </a:lvl4pPr>
+            <a:lvl5pPr marL="2057400" indent="-228600" algn="l" defTabSz="914400" rtl="0" eaLnBrk="1" latinLnBrk="0" hangingPunct="1">
+              <a:lnSpc>
+                <a:spcPct val="90000"/>
+              </a:lnSpc>
+              <a:spcBef>
+                <a:spcPts val="500"/>
+              </a:spcBef>
+              <a:buFont typeface="Arial" panose="020B0604020202020204" pitchFamily="34" charset="0"/>
+              <a:buChar char="•"/>
+              <a:defRPr sz="1800" kern="1200">
+                <a:solidFill>
+                  <a:schemeClr val="tx1"/>
+                </a:solidFill>
+                <a:latin typeface="+mn-lt"/>
+                <a:ea typeface="+mn-ea"/>
+                <a:cs typeface="+mn-cs"/>
+              </a:defRPr>
+            </a:lvl5pPr>
+            <a:lvl6pPr marL="2514600" indent="-228600" algn="l" defTabSz="914400" rtl="0" eaLnBrk="1" latinLnBrk="0" hangingPunct="1">
+              <a:lnSpc>
+                <a:spcPct val="90000"/>
+              </a:lnSpc>
+              <a:spcBef>
+                <a:spcPts val="500"/>
+              </a:spcBef>
+              <a:buFont typeface="Arial" panose="020B0604020202020204" pitchFamily="34" charset="0"/>
+              <a:buChar char="•"/>
+              <a:defRPr sz="1800" kern="1200">
+                <a:solidFill>
+                  <a:schemeClr val="tx1"/>
+                </a:solidFill>
+                <a:latin typeface="+mn-lt"/>
+                <a:ea typeface="+mn-ea"/>
+                <a:cs typeface="+mn-cs"/>
+              </a:defRPr>
+            </a:lvl6pPr>
+            <a:lvl7pPr marL="2971800" indent="-228600" algn="l" defTabSz="914400" rtl="0" eaLnBrk="1" latinLnBrk="0" hangingPunct="1">
+              <a:lnSpc>
+                <a:spcPct val="90000"/>
+              </a:lnSpc>
+              <a:spcBef>
+                <a:spcPts val="500"/>
+              </a:spcBef>
+              <a:buFont typeface="Arial" panose="020B0604020202020204" pitchFamily="34" charset="0"/>
+              <a:buChar char="•"/>
+              <a:defRPr sz="1800" kern="1200">
+                <a:solidFill>
+                  <a:schemeClr val="tx1"/>
+                </a:solidFill>
+                <a:latin typeface="+mn-lt"/>
+                <a:ea typeface="+mn-ea"/>
+                <a:cs typeface="+mn-cs"/>
+              </a:defRPr>
+            </a:lvl7pPr>
+            <a:lvl8pPr marL="3429000" indent="-228600" algn="l" defTabSz="914400" rtl="0" eaLnBrk="1" latinLnBrk="0" hangingPunct="1">
+              <a:lnSpc>
+                <a:spcPct val="90000"/>
+              </a:lnSpc>
+              <a:spcBef>
+                <a:spcPts val="500"/>
+              </a:spcBef>
+              <a:buFont typeface="Arial" panose="020B0604020202020204" pitchFamily="34" charset="0"/>
+              <a:buChar char="•"/>
+              <a:defRPr sz="1800" kern="1200">
+                <a:solidFill>
+                  <a:schemeClr val="tx1"/>
+                </a:solidFill>
+                <a:latin typeface="+mn-lt"/>
+                <a:ea typeface="+mn-ea"/>
+                <a:cs typeface="+mn-cs"/>
+              </a:defRPr>
+            </a:lvl8pPr>
+            <a:lvl9pPr marL="3886200" indent="-228600" algn="l" defTabSz="914400" rtl="0" eaLnBrk="1" latinLnBrk="0" hangingPunct="1">
+              <a:lnSpc>
+                <a:spcPct val="90000"/>
+              </a:lnSpc>
+              <a:spcBef>
+                <a:spcPts val="500"/>
+              </a:spcBef>
+              <a:buFont typeface="Arial" panose="020B0604020202020204" pitchFamily="34" charset="0"/>
+              <a:buChar char="•"/>
+              <a:defRPr sz="1800" kern="1200">
+                <a:solidFill>
+                  <a:schemeClr val="tx1"/>
+                </a:solidFill>
+                <a:latin typeface="+mn-lt"/>
+                <a:ea typeface="+mn-ea"/>
+                <a:cs typeface="+mn-cs"/>
+              </a:defRPr>
+            </a:lvl9pPr>
+          </a:lstStyle>
+          <a:p>
+            <a:r>
+              <a:rPr kumimoji="1" lang="en-US" altLang="zh-TW" sz="1600" dirty="0"/>
+              <a:t>An example of marginal empirical probability distribution.</a:t>
+            </a:r>
+          </a:p>
+        </p:txBody>
+      </p:sp>
+      <p:sp>
+        <p:nvSpPr>
+          <p:cNvPr id="19" name="內容版面配置區 2">
+            <a:extLst>
+              <a:ext uri="{FF2B5EF4-FFF2-40B4-BE49-F238E27FC236}">
+                <a16:creationId xmlns:a16="http://schemas.microsoft.com/office/drawing/2014/main" id="{DFC33640-BE19-0ABA-364B-5BCAE38ADC2E}"/>
+              </a:ext>
+            </a:extLst>
+          </p:cNvPr>
+          <p:cNvSpPr txBox="1">
+            <a:spLocks/>
+          </p:cNvSpPr>
+          <p:nvPr/>
+        </p:nvSpPr>
+        <p:spPr>
+          <a:xfrm>
+            <a:off x="6799580" y="5987506"/>
+            <a:ext cx="4745736" cy="376797"/>
+          </a:xfrm>
+          <a:prstGeom prst="rect">
+            <a:avLst/>
+          </a:prstGeom>
+        </p:spPr>
+        <p:txBody>
+          <a:bodyPr vert="horz" lIns="91440" tIns="45720" rIns="91440" bIns="45720" rtlCol="0">
+            <a:noAutofit/>
+          </a:bodyPr>
+          <a:lstStyle>
+            <a:lvl1pPr marL="228600" indent="-228600" algn="l" defTabSz="914400" rtl="0" eaLnBrk="1" latinLnBrk="0" hangingPunct="1">
+              <a:lnSpc>
+                <a:spcPct val="90000"/>
+              </a:lnSpc>
+              <a:spcBef>
+                <a:spcPts val="1000"/>
+              </a:spcBef>
+              <a:buFont typeface="Arial" panose="020B0604020202020204" pitchFamily="34" charset="0"/>
+              <a:buChar char="•"/>
+              <a:defRPr sz="2800" kern="1200">
+                <a:solidFill>
+                  <a:schemeClr val="tx1"/>
+                </a:solidFill>
+                <a:latin typeface="+mn-lt"/>
+                <a:ea typeface="+mn-ea"/>
+                <a:cs typeface="+mn-cs"/>
+              </a:defRPr>
+            </a:lvl1pPr>
+            <a:lvl2pPr marL="685800" indent="-228600" algn="l" defTabSz="914400" rtl="0" eaLnBrk="1" latinLnBrk="0" hangingPunct="1">
+              <a:lnSpc>
+                <a:spcPct val="90000"/>
+              </a:lnSpc>
+              <a:spcBef>
+                <a:spcPts val="500"/>
+              </a:spcBef>
+              <a:buFont typeface="Arial" panose="020B0604020202020204" pitchFamily="34" charset="0"/>
+              <a:buChar char="•"/>
+              <a:defRPr sz="2400" kern="1200">
+                <a:solidFill>
+                  <a:schemeClr val="tx1"/>
+                </a:solidFill>
+                <a:latin typeface="+mn-lt"/>
+                <a:ea typeface="+mn-ea"/>
+                <a:cs typeface="+mn-cs"/>
+              </a:defRPr>
+            </a:lvl2pPr>
+            <a:lvl3pPr marL="1143000" indent="-228600" algn="l" defTabSz="914400" rtl="0" eaLnBrk="1" latinLnBrk="0" hangingPunct="1">
+              <a:lnSpc>
+                <a:spcPct val="90000"/>
+              </a:lnSpc>
+              <a:spcBef>
+                <a:spcPts val="500"/>
+              </a:spcBef>
+              <a:buFont typeface="Arial" panose="020B0604020202020204" pitchFamily="34" charset="0"/>
+              <a:buChar char="•"/>
+              <a:defRPr sz="2000" kern="1200">
+                <a:solidFill>
+                  <a:schemeClr val="tx1"/>
+                </a:solidFill>
+                <a:latin typeface="+mn-lt"/>
+                <a:ea typeface="+mn-ea"/>
+                <a:cs typeface="+mn-cs"/>
+              </a:defRPr>
+            </a:lvl3pPr>
+            <a:lvl4pPr marL="1600200" indent="-228600" algn="l" defTabSz="914400" rtl="0" eaLnBrk="1" latinLnBrk="0" hangingPunct="1">
+              <a:lnSpc>
+                <a:spcPct val="90000"/>
+              </a:lnSpc>
+              <a:spcBef>
+                <a:spcPts val="500"/>
+              </a:spcBef>
+              <a:buFont typeface="Arial" panose="020B0604020202020204" pitchFamily="34" charset="0"/>
+              <a:buChar char="•"/>
+              <a:defRPr sz="1800" kern="1200">
+                <a:solidFill>
+                  <a:schemeClr val="tx1"/>
+                </a:solidFill>
+                <a:latin typeface="+mn-lt"/>
+                <a:ea typeface="+mn-ea"/>
+                <a:cs typeface="+mn-cs"/>
+              </a:defRPr>
+            </a:lvl4pPr>
+            <a:lvl5pPr marL="2057400" indent="-228600" algn="l" defTabSz="914400" rtl="0" eaLnBrk="1" latinLnBrk="0" hangingPunct="1">
+              <a:lnSpc>
+                <a:spcPct val="90000"/>
+              </a:lnSpc>
+              <a:spcBef>
+                <a:spcPts val="500"/>
+              </a:spcBef>
+              <a:buFont typeface="Arial" panose="020B0604020202020204" pitchFamily="34" charset="0"/>
+              <a:buChar char="•"/>
+              <a:defRPr sz="1800" kern="1200">
+                <a:solidFill>
+                  <a:schemeClr val="tx1"/>
+                </a:solidFill>
+                <a:latin typeface="+mn-lt"/>
+                <a:ea typeface="+mn-ea"/>
+                <a:cs typeface="+mn-cs"/>
+              </a:defRPr>
+            </a:lvl5pPr>
+            <a:lvl6pPr marL="2514600" indent="-228600" algn="l" defTabSz="914400" rtl="0" eaLnBrk="1" latinLnBrk="0" hangingPunct="1">
+              <a:lnSpc>
+                <a:spcPct val="90000"/>
+              </a:lnSpc>
+              <a:spcBef>
+                <a:spcPts val="500"/>
+              </a:spcBef>
+              <a:buFont typeface="Arial" panose="020B0604020202020204" pitchFamily="34" charset="0"/>
+              <a:buChar char="•"/>
+              <a:defRPr sz="1800" kern="1200">
+                <a:solidFill>
+                  <a:schemeClr val="tx1"/>
+                </a:solidFill>
+                <a:latin typeface="+mn-lt"/>
+                <a:ea typeface="+mn-ea"/>
+                <a:cs typeface="+mn-cs"/>
+              </a:defRPr>
+            </a:lvl6pPr>
+            <a:lvl7pPr marL="2971800" indent="-228600" algn="l" defTabSz="914400" rtl="0" eaLnBrk="1" latinLnBrk="0" hangingPunct="1">
+              <a:lnSpc>
+                <a:spcPct val="90000"/>
+              </a:lnSpc>
+              <a:spcBef>
+                <a:spcPts val="500"/>
+              </a:spcBef>
+              <a:buFont typeface="Arial" panose="020B0604020202020204" pitchFamily="34" charset="0"/>
+              <a:buChar char="•"/>
+              <a:defRPr sz="1800" kern="1200">
+                <a:solidFill>
+                  <a:schemeClr val="tx1"/>
+                </a:solidFill>
+                <a:latin typeface="+mn-lt"/>
+                <a:ea typeface="+mn-ea"/>
+                <a:cs typeface="+mn-cs"/>
+              </a:defRPr>
+            </a:lvl7pPr>
+            <a:lvl8pPr marL="3429000" indent="-228600" algn="l" defTabSz="914400" rtl="0" eaLnBrk="1" latinLnBrk="0" hangingPunct="1">
+              <a:lnSpc>
+                <a:spcPct val="90000"/>
+              </a:lnSpc>
+              <a:spcBef>
+                <a:spcPts val="500"/>
+              </a:spcBef>
+              <a:buFont typeface="Arial" panose="020B0604020202020204" pitchFamily="34" charset="0"/>
+              <a:buChar char="•"/>
+              <a:defRPr sz="1800" kern="1200">
+                <a:solidFill>
+                  <a:schemeClr val="tx1"/>
+                </a:solidFill>
+                <a:latin typeface="+mn-lt"/>
+                <a:ea typeface="+mn-ea"/>
+                <a:cs typeface="+mn-cs"/>
+              </a:defRPr>
+            </a:lvl8pPr>
+            <a:lvl9pPr marL="3886200" indent="-228600" algn="l" defTabSz="914400" rtl="0" eaLnBrk="1" latinLnBrk="0" hangingPunct="1">
+              <a:lnSpc>
+                <a:spcPct val="90000"/>
+              </a:lnSpc>
+              <a:spcBef>
+                <a:spcPts val="500"/>
+              </a:spcBef>
+              <a:buFont typeface="Arial" panose="020B0604020202020204" pitchFamily="34" charset="0"/>
+              <a:buChar char="•"/>
+              <a:defRPr sz="1800" kern="1200">
+                <a:solidFill>
+                  <a:schemeClr val="tx1"/>
+                </a:solidFill>
+                <a:latin typeface="+mn-lt"/>
+                <a:ea typeface="+mn-ea"/>
+                <a:cs typeface="+mn-cs"/>
+              </a:defRPr>
+            </a:lvl9pPr>
+          </a:lstStyle>
+          <a:p>
+            <a:r>
+              <a:rPr kumimoji="1" lang="en-US" altLang="zh-TW" sz="1600" dirty="0"/>
+              <a:t>The corresponding conditional empirical distribution.</a:t>
+            </a:r>
+          </a:p>
+        </p:txBody>
+      </p:sp>
+      <p:cxnSp>
+        <p:nvCxnSpPr>
+          <p:cNvPr id="23" name="直線箭頭接點 22">
+            <a:extLst>
+              <a:ext uri="{FF2B5EF4-FFF2-40B4-BE49-F238E27FC236}">
+                <a16:creationId xmlns:a16="http://schemas.microsoft.com/office/drawing/2014/main" id="{2A038201-D989-B777-FC2C-C254BE19E985}"/>
+              </a:ext>
+            </a:extLst>
+          </p:cNvPr>
+          <p:cNvCxnSpPr>
+            <a:cxnSpLocks/>
+          </p:cNvCxnSpPr>
+          <p:nvPr/>
+        </p:nvCxnSpPr>
+        <p:spPr>
+          <a:xfrm>
+            <a:off x="5057583" y="6544510"/>
+            <a:ext cx="1669415" cy="0"/>
+          </a:xfrm>
+          <a:prstGeom prst="straightConnector1">
+            <a:avLst/>
+          </a:prstGeom>
+          <a:ln w="63500">
+            <a:tailEnd type="triangle"/>
+          </a:ln>
+        </p:spPr>
+        <p:style>
+          <a:lnRef idx="1">
+            <a:schemeClr val="accent2"/>
+          </a:lnRef>
+          <a:fillRef idx="0">
+            <a:schemeClr val="accent2"/>
+          </a:fillRef>
+          <a:effectRef idx="0">
+            <a:schemeClr val="accent2"/>
+          </a:effectRef>
+          <a:fontRef idx="minor">
+            <a:schemeClr val="tx1"/>
+          </a:fontRef>
+        </p:style>
+      </p:cxnSp>
+      <p:sp>
+        <p:nvSpPr>
+          <p:cNvPr id="27" name="文字方塊 26">
+            <a:extLst>
+              <a:ext uri="{FF2B5EF4-FFF2-40B4-BE49-F238E27FC236}">
+                <a16:creationId xmlns:a16="http://schemas.microsoft.com/office/drawing/2014/main" id="{487A6DA9-BCE6-2E71-D899-6DD8E90178E4}"/>
+              </a:ext>
+            </a:extLst>
+          </p:cNvPr>
+          <p:cNvSpPr txBox="1"/>
+          <p:nvPr/>
+        </p:nvSpPr>
+        <p:spPr>
+          <a:xfrm>
+            <a:off x="5203096" y="6064296"/>
+            <a:ext cx="1378391" cy="369332"/>
+          </a:xfrm>
+          <a:prstGeom prst="rect">
+            <a:avLst/>
+          </a:prstGeom>
+          <a:noFill/>
+        </p:spPr>
+        <p:txBody>
+          <a:bodyPr wrap="none" rtlCol="0">
+            <a:spAutoFit/>
+          </a:bodyPr>
+          <a:lstStyle/>
+          <a:p>
+            <a:r>
+              <a:rPr kumimoji="1" lang="en-US" altLang="zh-TW" b="1" i="1" dirty="0"/>
+              <a:t>conditioning</a:t>
+            </a:r>
+            <a:endParaRPr kumimoji="1" lang="zh-TW" altLang="en-US" b="1" i="1" dirty="0"/>
+          </a:p>
+        </p:txBody>
+      </p:sp>
+      <p:sp>
+        <p:nvSpPr>
+          <p:cNvPr id="29" name="文字方塊 28">
+            <a:extLst>
+              <a:ext uri="{FF2B5EF4-FFF2-40B4-BE49-F238E27FC236}">
+                <a16:creationId xmlns:a16="http://schemas.microsoft.com/office/drawing/2014/main" id="{C5D39DC8-74FE-0013-DE88-E4203B6915F6}"/>
+              </a:ext>
+            </a:extLst>
+          </p:cNvPr>
+          <p:cNvSpPr txBox="1"/>
+          <p:nvPr/>
+        </p:nvSpPr>
+        <p:spPr>
+          <a:xfrm>
+            <a:off x="7160615" y="5691921"/>
+            <a:ext cx="1611275" cy="307777"/>
+          </a:xfrm>
+          <a:prstGeom prst="rect">
+            <a:avLst/>
+          </a:prstGeom>
+          <a:noFill/>
+        </p:spPr>
+        <p:txBody>
+          <a:bodyPr wrap="none" rtlCol="0">
+            <a:spAutoFit/>
+          </a:bodyPr>
+          <a:lstStyle/>
+          <a:p>
+            <a:r>
+              <a:rPr kumimoji="1" lang="en-US" altLang="zh-TW" sz="1400" b="1" i="1" dirty="0"/>
+              <a:t>0.05 quantile value</a:t>
+            </a:r>
+            <a:endParaRPr kumimoji="1" lang="zh-TW" altLang="en-US" sz="1400" b="1" i="1" dirty="0"/>
+          </a:p>
+        </p:txBody>
+      </p:sp>
+      <p:sp>
+        <p:nvSpPr>
+          <p:cNvPr id="13" name="標題 1">
+            <a:extLst>
+              <a:ext uri="{FF2B5EF4-FFF2-40B4-BE49-F238E27FC236}">
+                <a16:creationId xmlns:a16="http://schemas.microsoft.com/office/drawing/2014/main" id="{106EF599-A9D4-A501-4275-8E05FFB24634}"/>
+              </a:ext>
+            </a:extLst>
+          </p:cNvPr>
+          <p:cNvSpPr>
+            <a:spLocks noGrp="1"/>
+          </p:cNvSpPr>
+          <p:nvPr>
+            <p:ph type="title"/>
+          </p:nvPr>
+        </p:nvSpPr>
+        <p:spPr>
+          <a:xfrm>
+            <a:off x="838200" y="365125"/>
+            <a:ext cx="10515600" cy="1325563"/>
+          </a:xfrm>
+        </p:spPr>
+        <p:txBody>
+          <a:bodyPr>
+            <a:normAutofit/>
+          </a:bodyPr>
+          <a:lstStyle/>
+          <a:p>
+            <a:r>
+              <a:rPr kumimoji="1" lang="en-US" altLang="zh-TW" sz="3500" b="1" dirty="0">
+                <a:latin typeface="Times New Roman" panose="02020603050405020304" pitchFamily="18" charset="0"/>
+                <a:cs typeface="Times New Roman" panose="02020603050405020304" pitchFamily="18" charset="0"/>
+              </a:rPr>
+              <a:t>Our Solution</a:t>
+            </a:r>
+            <a:br>
+              <a:rPr kumimoji="1" lang="en-US" altLang="zh-TW" sz="3500" b="1" dirty="0">
+                <a:latin typeface="Times New Roman" panose="02020603050405020304" pitchFamily="18" charset="0"/>
+                <a:cs typeface="Times New Roman" panose="02020603050405020304" pitchFamily="18" charset="0"/>
+              </a:rPr>
+            </a:br>
+            <a:r>
+              <a:rPr kumimoji="1" lang="en-US" altLang="zh-TW" sz="3500" b="1" dirty="0">
+                <a:latin typeface="Times New Roman" panose="02020603050405020304" pitchFamily="18" charset="0"/>
+                <a:cs typeface="Times New Roman" panose="02020603050405020304" pitchFamily="18" charset="0"/>
+              </a:rPr>
+              <a:t>- Demo Pictures of Marginal and Conditional PDF</a:t>
+            </a:r>
+            <a:endParaRPr kumimoji="1" lang="zh-TW" altLang="en-US" sz="3500" b="1" dirty="0">
+              <a:latin typeface="Times New Roman" panose="02020603050405020304" pitchFamily="18" charset="0"/>
+              <a:cs typeface="Times New Roman" panose="02020603050405020304" pitchFamily="18" charset="0"/>
+            </a:endParaRPr>
+          </a:p>
+        </p:txBody>
+      </p:sp>
+      <p:sp>
+        <p:nvSpPr>
+          <p:cNvPr id="5" name="投影片編號版面配置區 4">
+            <a:extLst>
+              <a:ext uri="{FF2B5EF4-FFF2-40B4-BE49-F238E27FC236}">
+                <a16:creationId xmlns:a16="http://schemas.microsoft.com/office/drawing/2014/main" id="{34FD7CF4-E64F-D6A6-3FCB-F31F05CE066E}"/>
+              </a:ext>
+            </a:extLst>
+          </p:cNvPr>
+          <p:cNvSpPr>
+            <a:spLocks noGrp="1"/>
+          </p:cNvSpPr>
+          <p:nvPr>
+            <p:ph type="sldNum" sz="quarter" idx="12"/>
+          </p:nvPr>
+        </p:nvSpPr>
+        <p:spPr/>
+        <p:txBody>
+          <a:bodyPr/>
+          <a:lstStyle/>
+          <a:p>
+            <a:fld id="{EBC81C9E-5C6F-BE43-A2DB-9F7FDEA567D5}" type="slidenum">
+              <a:rPr kumimoji="1" lang="zh-TW" altLang="en-US" smtClean="0"/>
+              <a:t>10</a:t>
+            </a:fld>
+            <a:endParaRPr kumimoji="1" lang="zh-TW" altLang="en-US"/>
+          </a:p>
+        </p:txBody>
+      </p:sp>
+    </p:spTree>
+    <p:extLst>
+      <p:ext uri="{BB962C8B-B14F-4D97-AF65-F5344CB8AC3E}">
+        <p14:creationId xmlns:p14="http://schemas.microsoft.com/office/powerpoint/2010/main" val="2351825874"/>
+      </p:ext>
+    </p:extLst>
+  </p:cSld>
+  <p:clrMapOvr>
+    <a:masterClrMapping/>
+  </p:clrMapOvr>
+</p:sld>
+</file>
+
+<file path=ppt/slides/slide11.xml><?xml version="1.0" encoding="utf-8"?>
 <p:sld xmlns:a="http://schemas.openxmlformats.org/drawingml/2006/main" xmlns:r="http://schemas.openxmlformats.org/officeDocument/2006/relationships" xmlns:p="http://schemas.openxmlformats.org/presentationml/2006/main">
   <p:cSld>
     <p:spTree>
@@ -4211,6 +4927,35 @@
           </a:p>
         </p:txBody>
       </p:sp>
+      <p:sp>
+        <p:nvSpPr>
+          <p:cNvPr id="4" name="投影片編號版面配置區 3">
+            <a:extLst>
+              <a:ext uri="{FF2B5EF4-FFF2-40B4-BE49-F238E27FC236}">
+                <a16:creationId xmlns:a16="http://schemas.microsoft.com/office/drawing/2014/main" id="{E24B7315-732D-D908-2129-370EEFD398FC}"/>
+              </a:ext>
+            </a:extLst>
+          </p:cNvPr>
+          <p:cNvSpPr>
+            <a:spLocks noGrp="1"/>
+          </p:cNvSpPr>
+          <p:nvPr>
+            <p:ph type="sldNum" sz="quarter" idx="12"/>
+          </p:nvPr>
+        </p:nvSpPr>
+        <p:spPr/>
+        <p:txBody>
+          <a:bodyPr/>
+          <a:lstStyle/>
+          <a:p>
+            <a:fld id="{EBC81C9E-5C6F-BE43-A2DB-9F7FDEA567D5}" type="slidenum">
+              <a:rPr kumimoji="1" lang="zh-TW" altLang="en-US" smtClean="0"/>
+              <a:t>11</a:t>
+            </a:fld>
+            <a:endParaRPr kumimoji="1" lang="zh-TW" altLang="en-US"/>
+          </a:p>
+        </p:txBody>
+      </p:sp>
     </p:spTree>
     <p:extLst>
       <p:ext uri="{BB962C8B-B14F-4D97-AF65-F5344CB8AC3E}">
@@ -4224,7 +4969,7 @@
 </p:sld>
 </file>
 
-<file path=ppt/slides/slide11.xml><?xml version="1.0" encoding="utf-8"?>
+<file path=ppt/slides/slide12.xml><?xml version="1.0" encoding="utf-8"?>
 <p:sld xmlns:a="http://schemas.openxmlformats.org/drawingml/2006/main" xmlns:r="http://schemas.openxmlformats.org/officeDocument/2006/relationships" xmlns:p="http://schemas.openxmlformats.org/presentationml/2006/main">
   <p:cSld>
     <p:spTree>
@@ -4451,8 +5196,8 @@
           </p:sp>
         </mc:Fallback>
       </mc:AlternateContent>
-      <mc:AlternateContent xmlns:mc="http://schemas.openxmlformats.org/markup-compatibility/2006" xmlns:a14="http://schemas.microsoft.com/office/drawing/2010/main">
-        <mc:Choice Requires="a14">
+      <mc:AlternateContent xmlns:mc="http://schemas.openxmlformats.org/markup-compatibility/2006">
+        <mc:Choice xmlns:a14="http://schemas.microsoft.com/office/drawing/2010/main" Requires="a14">
           <p:sp>
             <p:nvSpPr>
               <p:cNvPr id="20" name="內容版面配置區 2">
@@ -4682,11 +5427,6 @@
                   <a:rPr kumimoji="1" lang="en-US" altLang="zh-TW" sz="1800" dirty="0"/>
                   <a:t>. </a:t>
                 </a:r>
-                <a:r>
-                  <a:rPr kumimoji="1" lang="zh-TW" altLang="en-US" sz="1800" dirty="0"/>
-                  <a:t>提一嘴劉老師的建議我們採納了。</a:t>
-                </a:r>
-                <a:endParaRPr kumimoji="1" lang="en-US" altLang="zh-TW" sz="1800" dirty="0"/>
               </a:p>
               <a:p>
                 <a:r>
@@ -4703,7 +5443,7 @@
             </p:txBody>
           </p:sp>
         </mc:Choice>
-        <mc:Fallback xmlns="">
+        <mc:Fallback>
           <p:sp>
             <p:nvSpPr>
               <p:cNvPr id="20" name="內容版面配置區 2">
@@ -4868,6 +5608,35 @@
           </a:p>
         </p:txBody>
       </p:sp>
+      <p:sp>
+        <p:nvSpPr>
+          <p:cNvPr id="3" name="投影片編號版面配置區 2">
+            <a:extLst>
+              <a:ext uri="{FF2B5EF4-FFF2-40B4-BE49-F238E27FC236}">
+                <a16:creationId xmlns:a16="http://schemas.microsoft.com/office/drawing/2014/main" id="{DE0F84F4-7895-C09F-62B0-00BA256E79DB}"/>
+              </a:ext>
+            </a:extLst>
+          </p:cNvPr>
+          <p:cNvSpPr>
+            <a:spLocks noGrp="1"/>
+          </p:cNvSpPr>
+          <p:nvPr>
+            <p:ph type="sldNum" sz="quarter" idx="12"/>
+          </p:nvPr>
+        </p:nvSpPr>
+        <p:spPr/>
+        <p:txBody>
+          <a:bodyPr/>
+          <a:lstStyle/>
+          <a:p>
+            <a:fld id="{EBC81C9E-5C6F-BE43-A2DB-9F7FDEA567D5}" type="slidenum">
+              <a:rPr kumimoji="1" lang="zh-TW" altLang="en-US" smtClean="0"/>
+              <a:t>12</a:t>
+            </a:fld>
+            <a:endParaRPr kumimoji="1" lang="zh-TW" altLang="en-US"/>
+          </a:p>
+        </p:txBody>
+      </p:sp>
     </p:spTree>
     <p:extLst>
       <p:ext uri="{BB962C8B-B14F-4D97-AF65-F5344CB8AC3E}">
@@ -4881,7 +5650,7 @@
 </p:sld>
 </file>
 
-<file path=ppt/slides/slide12.xml><?xml version="1.0" encoding="utf-8"?>
+<file path=ppt/slides/slide13.xml><?xml version="1.0" encoding="utf-8"?>
 <p:sld xmlns:a="http://schemas.openxmlformats.org/drawingml/2006/main" xmlns:r="http://schemas.openxmlformats.org/officeDocument/2006/relationships" xmlns:p="http://schemas.openxmlformats.org/presentationml/2006/main">
   <p:cSld>
     <p:spTree>
@@ -5368,6 +6137,35 @@
           </p:sp>
         </mc:Fallback>
       </mc:AlternateContent>
+      <p:sp>
+        <p:nvSpPr>
+          <p:cNvPr id="3" name="投影片編號版面配置區 2">
+            <a:extLst>
+              <a:ext uri="{FF2B5EF4-FFF2-40B4-BE49-F238E27FC236}">
+                <a16:creationId xmlns:a16="http://schemas.microsoft.com/office/drawing/2014/main" id="{E3A2083C-1C56-611A-2556-FAFF4EF254C2}"/>
+              </a:ext>
+            </a:extLst>
+          </p:cNvPr>
+          <p:cNvSpPr>
+            <a:spLocks noGrp="1"/>
+          </p:cNvSpPr>
+          <p:nvPr>
+            <p:ph type="sldNum" sz="quarter" idx="12"/>
+          </p:nvPr>
+        </p:nvSpPr>
+        <p:spPr/>
+        <p:txBody>
+          <a:bodyPr/>
+          <a:lstStyle/>
+          <a:p>
+            <a:fld id="{EBC81C9E-5C6F-BE43-A2DB-9F7FDEA567D5}" type="slidenum">
+              <a:rPr kumimoji="1" lang="zh-TW" altLang="en-US" smtClean="0"/>
+              <a:t>13</a:t>
+            </a:fld>
+            <a:endParaRPr kumimoji="1" lang="zh-TW" altLang="en-US"/>
+          </a:p>
+        </p:txBody>
+      </p:sp>
     </p:spTree>
     <p:extLst>
       <p:ext uri="{BB962C8B-B14F-4D97-AF65-F5344CB8AC3E}">
@@ -5381,7 +6179,7 @@
 </p:sld>
 </file>
 
-<file path=ppt/slides/slide13.xml><?xml version="1.0" encoding="utf-8"?>
+<file path=ppt/slides/slide14.xml><?xml version="1.0" encoding="utf-8"?>
 <p:sld xmlns:a="http://schemas.openxmlformats.org/drawingml/2006/main" xmlns:r="http://schemas.openxmlformats.org/officeDocument/2006/relationships" xmlns:p="http://schemas.openxmlformats.org/presentationml/2006/main">
   <p:cSld>
     <p:spTree>
@@ -5937,6 +6735,35 @@
           </a:p>
         </p:txBody>
       </p:sp>
+      <p:sp>
+        <p:nvSpPr>
+          <p:cNvPr id="2" name="投影片編號版面配置區 1">
+            <a:extLst>
+              <a:ext uri="{FF2B5EF4-FFF2-40B4-BE49-F238E27FC236}">
+                <a16:creationId xmlns:a16="http://schemas.microsoft.com/office/drawing/2014/main" id="{59CC3FA5-B9AC-5FEC-6548-F4B6F7A84E24}"/>
+              </a:ext>
+            </a:extLst>
+          </p:cNvPr>
+          <p:cNvSpPr>
+            <a:spLocks noGrp="1"/>
+          </p:cNvSpPr>
+          <p:nvPr>
+            <p:ph type="sldNum" sz="quarter" idx="12"/>
+          </p:nvPr>
+        </p:nvSpPr>
+        <p:spPr/>
+        <p:txBody>
+          <a:bodyPr/>
+          <a:lstStyle/>
+          <a:p>
+            <a:fld id="{EBC81C9E-5C6F-BE43-A2DB-9F7FDEA567D5}" type="slidenum">
+              <a:rPr kumimoji="1" lang="zh-TW" altLang="en-US" smtClean="0"/>
+              <a:t>14</a:t>
+            </a:fld>
+            <a:endParaRPr kumimoji="1" lang="zh-TW" altLang="en-US"/>
+          </a:p>
+        </p:txBody>
+      </p:sp>
     </p:spTree>
     <p:extLst>
       <p:ext uri="{BB962C8B-B14F-4D97-AF65-F5344CB8AC3E}">
@@ -5950,7 +6777,7 @@
 </p:sld>
 </file>
 
-<file path=ppt/slides/slide14.xml><?xml version="1.0" encoding="utf-8"?>
+<file path=ppt/slides/slide15.xml><?xml version="1.0" encoding="utf-8"?>
 <p:sld xmlns:a="http://schemas.openxmlformats.org/drawingml/2006/main" xmlns:r="http://schemas.openxmlformats.org/officeDocument/2006/relationships" xmlns:p="http://schemas.openxmlformats.org/presentationml/2006/main">
   <p:cSld>
     <p:spTree>
@@ -6165,7 +6992,7 @@
         <p:spPr>
           <a:xfrm>
             <a:off x="838200" y="5946859"/>
-            <a:ext cx="9646920" cy="546016"/>
+            <a:ext cx="10192966" cy="546016"/>
           </a:xfrm>
           <a:prstGeom prst="rect">
             <a:avLst/>
@@ -6342,8 +7169,37 @@
           <a:p>
             <a:r>
               <a:rPr kumimoji="1" lang="en-US" altLang="zh-TW" i="1" dirty="0"/>
-              <a:t>Again, everything shows pretty much the same trend as before.</a:t>
+              <a:t>Again, everything shows pretty much the same trade off as before.</a:t>
             </a:r>
+          </a:p>
+        </p:txBody>
+      </p:sp>
+      <p:sp>
+        <p:nvSpPr>
+          <p:cNvPr id="2" name="投影片編號版面配置區 1">
+            <a:extLst>
+              <a:ext uri="{FF2B5EF4-FFF2-40B4-BE49-F238E27FC236}">
+                <a16:creationId xmlns:a16="http://schemas.microsoft.com/office/drawing/2014/main" id="{6B257CF7-DEA7-D1F7-D367-F550FAE9C8A1}"/>
+              </a:ext>
+            </a:extLst>
+          </p:cNvPr>
+          <p:cNvSpPr>
+            <a:spLocks noGrp="1"/>
+          </p:cNvSpPr>
+          <p:nvPr>
+            <p:ph type="sldNum" sz="quarter" idx="12"/>
+          </p:nvPr>
+        </p:nvSpPr>
+        <p:spPr/>
+        <p:txBody>
+          <a:bodyPr/>
+          <a:lstStyle/>
+          <a:p>
+            <a:fld id="{EBC81C9E-5C6F-BE43-A2DB-9F7FDEA567D5}" type="slidenum">
+              <a:rPr kumimoji="1" lang="zh-TW" altLang="en-US" smtClean="0"/>
+              <a:t>15</a:t>
+            </a:fld>
+            <a:endParaRPr kumimoji="1" lang="zh-TW" altLang="en-US"/>
           </a:p>
         </p:txBody>
       </p:sp>
@@ -6360,7 +7216,7 @@
 </p:sld>
 </file>
 
-<file path=ppt/slides/slide15.xml><?xml version="1.0" encoding="utf-8"?>
+<file path=ppt/slides/slide16.xml><?xml version="1.0" encoding="utf-8"?>
 <p:sld xmlns:a="http://schemas.openxmlformats.org/drawingml/2006/main" xmlns:r="http://schemas.openxmlformats.org/officeDocument/2006/relationships" xmlns:p="http://schemas.openxmlformats.org/presentationml/2006/main">
   <p:cSld>
     <p:spTree>
@@ -6442,21 +7298,13 @@
           <a:p>
             <a:r>
               <a:rPr lang="en-US" altLang="zh-TW" dirty="0"/>
-              <a:t>We proposed and demonstrated a history-based short-term bandwidth predicting method called conditional probability distribution, which has practical values in live video streaming. </a:t>
+              <a:t>We proposed and demonstrated a history-based short-term bandwidth predicting method which has its practical value in live video streaming. </a:t>
             </a:r>
           </a:p>
           <a:p>
             <a:r>
               <a:rPr lang="en-US" altLang="zh-TW" dirty="0"/>
-              <a:t>Our method uses the empirical conditional relative frequency to find the largest frame size while eliminating the probability of introducing delay under </a:t>
-            </a:r>
-            <a:r>
-              <a:rPr lang="en-US" altLang="zh-TW" i="1" dirty="0"/>
-              <a:t>any</a:t>
-            </a:r>
-            <a:r>
-              <a:rPr lang="en-US" altLang="zh-TW" dirty="0"/>
-              <a:t> networks. </a:t>
+              <a:t>Our method uses the empirical conditional probability to find the largest frame size while eliminating the probability of introducing a frame dropping under a network. </a:t>
             </a:r>
           </a:p>
           <a:p>
@@ -6476,7 +7324,7 @@
             <a:pPr lvl="1"/>
             <a:r>
               <a:rPr lang="en-US" altLang="zh-TW" dirty="0"/>
-              <a:t>faster implementations of the algorithm in both space and time complexities</a:t>
+              <a:t>better implementations of the algorithm in both space and time complexities</a:t>
             </a:r>
           </a:p>
           <a:p>
@@ -6494,6 +7342,35 @@
               <a:t>Etc.</a:t>
             </a:r>
             <a:endParaRPr lang="en-US" altLang="zh-TW" dirty="0"/>
+          </a:p>
+        </p:txBody>
+      </p:sp>
+      <p:sp>
+        <p:nvSpPr>
+          <p:cNvPr id="4" name="投影片編號版面配置區 3">
+            <a:extLst>
+              <a:ext uri="{FF2B5EF4-FFF2-40B4-BE49-F238E27FC236}">
+                <a16:creationId xmlns:a16="http://schemas.microsoft.com/office/drawing/2014/main" id="{75379283-5E2D-B1C5-99A8-A9ACE16C39F4}"/>
+              </a:ext>
+            </a:extLst>
+          </p:cNvPr>
+          <p:cNvSpPr>
+            <a:spLocks noGrp="1"/>
+          </p:cNvSpPr>
+          <p:nvPr>
+            <p:ph type="sldNum" sz="quarter" idx="12"/>
+          </p:nvPr>
+        </p:nvSpPr>
+        <p:spPr/>
+        <p:txBody>
+          <a:bodyPr/>
+          <a:lstStyle/>
+          <a:p>
+            <a:fld id="{EBC81C9E-5C6F-BE43-A2DB-9F7FDEA567D5}" type="slidenum">
+              <a:rPr kumimoji="1" lang="zh-TW" altLang="en-US" smtClean="0"/>
+              <a:t>16</a:t>
+            </a:fld>
+            <a:endParaRPr kumimoji="1" lang="zh-TW" altLang="en-US"/>
           </a:p>
         </p:txBody>
       </p:sp>
@@ -6510,7 +7387,7 @@
 </p:sld>
 </file>
 
-<file path=ppt/slides/slide16.xml><?xml version="1.0" encoding="utf-8"?>
+<file path=ppt/slides/slide17.xml><?xml version="1.0" encoding="utf-8"?>
 <p:sld xmlns:a="http://schemas.openxmlformats.org/drawingml/2006/main" xmlns:r="http://schemas.openxmlformats.org/officeDocument/2006/relationships" xmlns:p="http://schemas.openxmlformats.org/presentationml/2006/main">
   <p:cSld>
     <p:spTree>
@@ -6612,6 +7489,35 @@
               <a:rPr lang="zh-TW" altLang="en-US" b="1" dirty="0"/>
               <a:t>謝謝各位的聆聽。</a:t>
             </a:r>
+          </a:p>
+        </p:txBody>
+      </p:sp>
+      <p:sp>
+        <p:nvSpPr>
+          <p:cNvPr id="2" name="投影片編號版面配置區 1">
+            <a:extLst>
+              <a:ext uri="{FF2B5EF4-FFF2-40B4-BE49-F238E27FC236}">
+                <a16:creationId xmlns:a16="http://schemas.microsoft.com/office/drawing/2014/main" id="{D7DBA089-DDC5-E4D6-FDD0-C60DB444764E}"/>
+              </a:ext>
+            </a:extLst>
+          </p:cNvPr>
+          <p:cNvSpPr>
+            <a:spLocks noGrp="1"/>
+          </p:cNvSpPr>
+          <p:nvPr>
+            <p:ph type="sldNum" sz="quarter" idx="12"/>
+          </p:nvPr>
+        </p:nvSpPr>
+        <p:spPr/>
+        <p:txBody>
+          <a:bodyPr/>
+          <a:lstStyle/>
+          <a:p>
+            <a:fld id="{EBC81C9E-5C6F-BE43-A2DB-9F7FDEA567D5}" type="slidenum">
+              <a:rPr kumimoji="1" lang="zh-TW" altLang="en-US" smtClean="0"/>
+              <a:t>17</a:t>
+            </a:fld>
+            <a:endParaRPr kumimoji="1" lang="zh-TW" altLang="en-US"/>
           </a:p>
         </p:txBody>
       </p:sp>
@@ -6762,6 +7668,35 @@
               <a:latin typeface="Times New Roman" panose="02020603050405020304" pitchFamily="18" charset="0"/>
               <a:cs typeface="Times New Roman" panose="02020603050405020304" pitchFamily="18" charset="0"/>
             </a:endParaRPr>
+          </a:p>
+        </p:txBody>
+      </p:sp>
+      <p:sp>
+        <p:nvSpPr>
+          <p:cNvPr id="2" name="投影片編號版面配置區 1">
+            <a:extLst>
+              <a:ext uri="{FF2B5EF4-FFF2-40B4-BE49-F238E27FC236}">
+                <a16:creationId xmlns:a16="http://schemas.microsoft.com/office/drawing/2014/main" id="{A2971BE8-4C33-DC73-F005-0B1176303E60}"/>
+              </a:ext>
+            </a:extLst>
+          </p:cNvPr>
+          <p:cNvSpPr>
+            <a:spLocks noGrp="1"/>
+          </p:cNvSpPr>
+          <p:nvPr>
+            <p:ph type="sldNum" sz="quarter" idx="12"/>
+          </p:nvPr>
+        </p:nvSpPr>
+        <p:spPr/>
+        <p:txBody>
+          <a:bodyPr/>
+          <a:lstStyle/>
+          <a:p>
+            <a:fld id="{EBC81C9E-5C6F-BE43-A2DB-9F7FDEA567D5}" type="slidenum">
+              <a:rPr kumimoji="1" lang="zh-TW" altLang="en-US" smtClean="0"/>
+              <a:t>2</a:t>
+            </a:fld>
+            <a:endParaRPr kumimoji="1" lang="zh-TW" altLang="en-US"/>
           </a:p>
         </p:txBody>
       </p:sp>
@@ -6944,7 +7879,7 @@
         </p:nvSpPr>
         <p:spPr>
           <a:xfrm>
-            <a:off x="10763048" y="5282591"/>
+            <a:off x="10763048" y="4820952"/>
             <a:ext cx="954155" cy="313593"/>
           </a:xfrm>
           <a:prstGeom prst="roundRect">
@@ -7099,8 +8034,8 @@
         </p:nvCxnSpPr>
         <p:spPr>
           <a:xfrm flipV="1">
-            <a:off x="10372682" y="5439388"/>
-            <a:ext cx="390366" cy="425182"/>
+            <a:off x="10372682" y="4977749"/>
+            <a:ext cx="390366" cy="886821"/>
           </a:xfrm>
           <a:prstGeom prst="straightConnector1">
             <a:avLst/>
@@ -7669,7 +8604,7 @@
         </p:nvSpPr>
         <p:spPr>
           <a:xfrm>
-            <a:off x="10763048" y="5713305"/>
+            <a:off x="10763048" y="5358196"/>
             <a:ext cx="954155" cy="313593"/>
           </a:xfrm>
           <a:prstGeom prst="roundRect">
@@ -7723,9 +8658,9 @@
           <p:nvPr/>
         </p:nvCxnSpPr>
         <p:spPr>
-          <a:xfrm>
-            <a:off x="10372682" y="5864570"/>
-            <a:ext cx="390366" cy="5532"/>
+          <a:xfrm flipV="1">
+            <a:off x="10372682" y="5514993"/>
+            <a:ext cx="390366" cy="349577"/>
           </a:xfrm>
           <a:prstGeom prst="straightConnector1">
             <a:avLst/>
@@ -7766,7 +8701,7 @@
         </p:nvSpPr>
         <p:spPr>
           <a:xfrm>
-            <a:off x="10763048" y="6198668"/>
+            <a:off x="10763048" y="5852437"/>
             <a:ext cx="954155" cy="313593"/>
           </a:xfrm>
           <a:prstGeom prst="roundRect">
@@ -7822,7 +8757,7 @@
         <p:spPr>
           <a:xfrm>
             <a:off x="10372682" y="5864570"/>
-            <a:ext cx="390366" cy="490895"/>
+            <a:ext cx="390366" cy="144664"/>
           </a:xfrm>
           <a:prstGeom prst="straightConnector1">
             <a:avLst/>
@@ -8204,6 +9139,35 @@
           </a:p>
         </p:txBody>
       </p:sp>
+      <p:sp>
+        <p:nvSpPr>
+          <p:cNvPr id="2" name="投影片編號版面配置區 1">
+            <a:extLst>
+              <a:ext uri="{FF2B5EF4-FFF2-40B4-BE49-F238E27FC236}">
+                <a16:creationId xmlns:a16="http://schemas.microsoft.com/office/drawing/2014/main" id="{50406986-55D8-79F0-64F1-4190C0DB5BD5}"/>
+              </a:ext>
+            </a:extLst>
+          </p:cNvPr>
+          <p:cNvSpPr>
+            <a:spLocks noGrp="1"/>
+          </p:cNvSpPr>
+          <p:nvPr>
+            <p:ph type="sldNum" sz="quarter" idx="12"/>
+          </p:nvPr>
+        </p:nvSpPr>
+        <p:spPr/>
+        <p:txBody>
+          <a:bodyPr/>
+          <a:lstStyle/>
+          <a:p>
+            <a:fld id="{EBC81C9E-5C6F-BE43-A2DB-9F7FDEA567D5}" type="slidenum">
+              <a:rPr kumimoji="1" lang="zh-TW" altLang="en-US" smtClean="0"/>
+              <a:t>3</a:t>
+            </a:fld>
+            <a:endParaRPr kumimoji="1" lang="zh-TW" altLang="en-US"/>
+          </a:p>
+        </p:txBody>
+      </p:sp>
     </p:spTree>
     <p:extLst>
       <p:ext uri="{BB962C8B-B14F-4D97-AF65-F5344CB8AC3E}">
@@ -8234,6 +9198,36 @@
           <a:chExt cx="0" cy="0"/>
         </a:xfrm>
       </p:grpSpPr>
+      <p:pic>
+        <p:nvPicPr>
+          <p:cNvPr id="9" name="圖片 8">
+            <a:extLst>
+              <a:ext uri="{FF2B5EF4-FFF2-40B4-BE49-F238E27FC236}">
+                <a16:creationId xmlns:a16="http://schemas.microsoft.com/office/drawing/2014/main" id="{EF7FE008-49BD-0C11-B7B1-D4F22BC3879F}"/>
+              </a:ext>
+            </a:extLst>
+          </p:cNvPr>
+          <p:cNvPicPr>
+            <a:picLocks noChangeAspect="1"/>
+          </p:cNvPicPr>
+          <p:nvPr/>
+        </p:nvPicPr>
+        <p:blipFill>
+          <a:blip r:embed="rId2"/>
+          <a:stretch>
+            <a:fillRect/>
+          </a:stretch>
+        </p:blipFill>
+        <p:spPr>
+          <a:xfrm>
+            <a:off x="5881995" y="2894163"/>
+            <a:ext cx="5410806" cy="3812712"/>
+          </a:xfrm>
+          <a:prstGeom prst="rect">
+            <a:avLst/>
+          </a:prstGeom>
+        </p:spPr>
+      </p:pic>
       <mc:AlternateContent xmlns:mc="http://schemas.openxmlformats.org/markup-compatibility/2006" xmlns:a14="http://schemas.microsoft.com/office/drawing/2010/main">
         <mc:Choice Requires="a14">
           <p:sp>
@@ -8363,7 +9357,7 @@
                 <a:ext cx="10697303" cy="1603375"/>
               </a:xfrm>
               <a:blipFill>
-                <a:blip r:embed="rId2"/>
+                <a:blip r:embed="rId3"/>
                 <a:stretch>
                   <a:fillRect l="-948" t="-6299"/>
                 </a:stretch>
@@ -8453,8 +9447,8 @@
           </a:p>
         </p:txBody>
       </p:sp>
-      <mc:AlternateContent xmlns:mc="http://schemas.openxmlformats.org/markup-compatibility/2006" xmlns:a14="http://schemas.microsoft.com/office/drawing/2010/main">
-        <mc:Choice Requires="a14">
+      <mc:AlternateContent xmlns:mc="http://schemas.openxmlformats.org/markup-compatibility/2006">
+        <mc:Choice xmlns:a14="http://schemas.microsoft.com/office/drawing/2010/main" Requires="a14">
           <p:sp>
             <p:nvSpPr>
               <p:cNvPr id="7" name="內容版面配置區 2">
@@ -8721,7 +9715,7 @@
                 </a14:m>
                 <a:r>
                   <a:rPr kumimoji="1" lang="en-US" altLang="zh-TW" dirty="0"/>
-                  <a:t>, is an array of past throughputs. </a:t>
+                  <a:t> (entry-wise division), is an array of past throughputs. </a:t>
                 </a:r>
               </a:p>
               <a:p>
@@ -8799,7 +9793,7 @@
             </p:txBody>
           </p:sp>
         </mc:Choice>
-        <mc:Fallback xmlns="">
+        <mc:Fallback>
           <p:sp>
             <p:nvSpPr>
               <p:cNvPr id="7" name="內容版面配置區 2">
@@ -8823,9 +9817,9 @@
                 <a:avLst/>
               </a:prstGeom>
               <a:blipFill>
-                <a:blip r:embed="rId3"/>
+                <a:blip r:embed="rId4"/>
                 <a:stretch>
-                  <a:fillRect l="-1900" t="-2326" r="-2375"/>
+                  <a:fillRect l="-1900" t="-2326" b="-2326"/>
                 </a:stretch>
               </a:blipFill>
             </p:spPr>
@@ -8844,36 +9838,769 @@
           </p:sp>
         </mc:Fallback>
       </mc:AlternateContent>
-      <p:pic>
-        <p:nvPicPr>
-          <p:cNvPr id="9" name="圖片 8">
+      <mc:AlternateContent xmlns:mc="http://schemas.openxmlformats.org/markup-compatibility/2006">
+        <mc:Choice xmlns:a14="http://schemas.microsoft.com/office/drawing/2010/main" Requires="a14">
+          <p:sp>
+            <p:nvSpPr>
+              <p:cNvPr id="2" name="文字方塊 1">
+                <a:extLst>
+                  <a:ext uri="{FF2B5EF4-FFF2-40B4-BE49-F238E27FC236}">
+                    <a16:creationId xmlns:a16="http://schemas.microsoft.com/office/drawing/2014/main" id="{4612332E-D59E-A174-5EE8-EAEC4FCAB261}"/>
+                  </a:ext>
+                </a:extLst>
+              </p:cNvPr>
+              <p:cNvSpPr txBox="1"/>
+              <p:nvPr/>
+            </p:nvSpPr>
+            <p:spPr>
+              <a:xfrm>
+                <a:off x="8326167" y="365125"/>
+                <a:ext cx="3781168" cy="1934056"/>
+              </a:xfrm>
+              <a:prstGeom prst="rect">
+                <a:avLst/>
+              </a:prstGeom>
+              <a:noFill/>
+            </p:spPr>
+            <p:txBody>
+              <a:bodyPr wrap="square" lIns="0" tIns="0" rIns="0" bIns="0" rtlCol="0">
+                <a:spAutoFit/>
+              </a:bodyPr>
+              <a:lstStyle/>
+              <a:p>
+                <a:r>
+                  <a:rPr kumimoji="1" lang="en-US" altLang="zh-TW" sz="2300" b="1" i="1" dirty="0">
+                    <a:solidFill>
+                      <a:srgbClr val="C00000"/>
+                    </a:solidFill>
+                  </a:rPr>
+                  <a:t>ESTR4998</a:t>
+                </a:r>
+                <a:r>
+                  <a:rPr kumimoji="1" lang="en-US" altLang="zh-TW" sz="2300" dirty="0">
+                    <a:solidFill>
+                      <a:srgbClr val="C00000"/>
+                    </a:solidFill>
+                  </a:rPr>
+                  <a:t>:  </a:t>
+                </a:r>
+                <a14:m>
+                  <m:oMath xmlns:m="http://schemas.openxmlformats.org/officeDocument/2006/math">
+                    <m:acc>
+                      <m:accPr>
+                        <m:chr m:val="̂"/>
+                        <m:ctrlPr>
+                          <a:rPr kumimoji="1" lang="zh-TW" altLang="en-US" sz="2300" i="1" smtClean="0">
+                            <a:solidFill>
+                              <a:srgbClr val="C00000"/>
+                            </a:solidFill>
+                            <a:latin typeface="Cambria Math" panose="02040503050406030204" pitchFamily="18" charset="0"/>
+                          </a:rPr>
+                        </m:ctrlPr>
+                      </m:accPr>
+                      <m:e>
+                        <m:sSub>
+                          <m:sSubPr>
+                            <m:ctrlPr>
+                              <a:rPr kumimoji="1" lang="en-US" altLang="zh-TW" sz="2300" i="1" smtClean="0">
+                                <a:solidFill>
+                                  <a:srgbClr val="C00000"/>
+                                </a:solidFill>
+                                <a:latin typeface="Cambria Math" panose="02040503050406030204" pitchFamily="18" charset="0"/>
+                              </a:rPr>
+                            </m:ctrlPr>
+                          </m:sSubPr>
+                          <m:e>
+                            <m:r>
+                              <a:rPr kumimoji="1" lang="en-US" altLang="zh-TW" sz="2300" b="0" i="1" smtClean="0">
+                                <a:solidFill>
+                                  <a:srgbClr val="C00000"/>
+                                </a:solidFill>
+                                <a:latin typeface="Cambria Math" panose="02040503050406030204" pitchFamily="18" charset="0"/>
+                              </a:rPr>
+                              <m:t>𝐶</m:t>
+                            </m:r>
+                          </m:e>
+                          <m:sub>
+                            <m:r>
+                              <a:rPr kumimoji="1" lang="en-US" altLang="zh-TW" sz="2300" b="0" i="1" smtClean="0">
+                                <a:solidFill>
+                                  <a:srgbClr val="C00000"/>
+                                </a:solidFill>
+                                <a:latin typeface="Cambria Math" panose="02040503050406030204" pitchFamily="18" charset="0"/>
+                              </a:rPr>
+                              <m:t>𝑖</m:t>
+                            </m:r>
+                            <m:r>
+                              <a:rPr kumimoji="1" lang="en-US" altLang="zh-TW" sz="2300" b="0" i="1" smtClean="0">
+                                <a:solidFill>
+                                  <a:srgbClr val="C00000"/>
+                                </a:solidFill>
+                                <a:latin typeface="Cambria Math" panose="02040503050406030204" pitchFamily="18" charset="0"/>
+                              </a:rPr>
+                              <m:t>+1</m:t>
+                            </m:r>
+                          </m:sub>
+                        </m:sSub>
+                      </m:e>
+                    </m:acc>
+                    <m:r>
+                      <a:rPr kumimoji="1" lang="en-US" altLang="zh-TW" sz="2300" b="0" i="1" smtClean="0">
+                        <a:solidFill>
+                          <a:srgbClr val="C00000"/>
+                        </a:solidFill>
+                        <a:latin typeface="Cambria Math" panose="02040503050406030204" pitchFamily="18" charset="0"/>
+                      </a:rPr>
+                      <m:t>=</m:t>
+                    </m:r>
+                    <m:f>
+                      <m:fPr>
+                        <m:ctrlPr>
+                          <a:rPr kumimoji="1" lang="en-US" altLang="zh-TW" sz="2300" b="0" i="1" smtClean="0">
+                            <a:solidFill>
+                              <a:srgbClr val="C00000"/>
+                            </a:solidFill>
+                            <a:latin typeface="Cambria Math" panose="02040503050406030204" pitchFamily="18" charset="0"/>
+                          </a:rPr>
+                        </m:ctrlPr>
+                      </m:fPr>
+                      <m:num>
+                        <m:r>
+                          <a:rPr kumimoji="1" lang="en-US" altLang="zh-TW" sz="2300" b="0" i="1" smtClean="0">
+                            <a:solidFill>
+                              <a:srgbClr val="C00000"/>
+                            </a:solidFill>
+                            <a:latin typeface="Cambria Math" panose="02040503050406030204" pitchFamily="18" charset="0"/>
+                          </a:rPr>
+                          <m:t>1</m:t>
+                        </m:r>
+                      </m:num>
+                      <m:den>
+                        <m:r>
+                          <a:rPr kumimoji="1" lang="en-US" altLang="zh-TW" sz="2300" b="0" i="1" smtClean="0">
+                            <a:solidFill>
+                              <a:srgbClr val="C00000"/>
+                            </a:solidFill>
+                            <a:latin typeface="Cambria Math" panose="02040503050406030204" pitchFamily="18" charset="0"/>
+                          </a:rPr>
+                          <m:t>𝐾</m:t>
+                        </m:r>
+                      </m:den>
+                    </m:f>
+                    <m:nary>
+                      <m:naryPr>
+                        <m:chr m:val="∑"/>
+                        <m:ctrlPr>
+                          <a:rPr kumimoji="1" lang="en-US" altLang="zh-TW" sz="2300" b="0" i="1" smtClean="0">
+                            <a:solidFill>
+                              <a:srgbClr val="C00000"/>
+                            </a:solidFill>
+                            <a:latin typeface="Cambria Math" panose="02040503050406030204" pitchFamily="18" charset="0"/>
+                          </a:rPr>
+                        </m:ctrlPr>
+                      </m:naryPr>
+                      <m:sub>
+                        <m:r>
+                          <m:rPr>
+                            <m:brk m:alnAt="23"/>
+                          </m:rPr>
+                          <a:rPr kumimoji="1" lang="en-US" altLang="zh-TW" sz="2300" b="0" i="1" smtClean="0">
+                            <a:solidFill>
+                              <a:srgbClr val="C00000"/>
+                            </a:solidFill>
+                            <a:latin typeface="Cambria Math" panose="02040503050406030204" pitchFamily="18" charset="0"/>
+                          </a:rPr>
+                          <m:t>𝑗</m:t>
+                        </m:r>
+                        <m:r>
+                          <a:rPr kumimoji="1" lang="en-US" altLang="zh-TW" sz="2300" b="0" i="1" smtClean="0">
+                            <a:solidFill>
+                              <a:srgbClr val="C00000"/>
+                            </a:solidFill>
+                            <a:latin typeface="Cambria Math" panose="02040503050406030204" pitchFamily="18" charset="0"/>
+                          </a:rPr>
+                          <m:t>=0</m:t>
+                        </m:r>
+                      </m:sub>
+                      <m:sup>
+                        <m:r>
+                          <a:rPr kumimoji="1" lang="en-US" altLang="zh-TW" sz="2300" b="0" i="1" smtClean="0">
+                            <a:solidFill>
+                              <a:srgbClr val="C00000"/>
+                            </a:solidFill>
+                            <a:latin typeface="Cambria Math" panose="02040503050406030204" pitchFamily="18" charset="0"/>
+                          </a:rPr>
+                          <m:t>𝐾</m:t>
+                        </m:r>
+                        <m:r>
+                          <a:rPr kumimoji="1" lang="en-US" altLang="zh-TW" sz="2300" b="0" i="1" smtClean="0">
+                            <a:solidFill>
+                              <a:srgbClr val="C00000"/>
+                            </a:solidFill>
+                            <a:latin typeface="Cambria Math" panose="02040503050406030204" pitchFamily="18" charset="0"/>
+                          </a:rPr>
+                          <m:t>−1</m:t>
+                        </m:r>
+                      </m:sup>
+                      <m:e>
+                        <m:sSub>
+                          <m:sSubPr>
+                            <m:ctrlPr>
+                              <a:rPr kumimoji="1" lang="en-US" altLang="zh-TW" sz="2300" b="0" i="1" smtClean="0">
+                                <a:solidFill>
+                                  <a:srgbClr val="C00000"/>
+                                </a:solidFill>
+                                <a:latin typeface="Cambria Math" panose="02040503050406030204" pitchFamily="18" charset="0"/>
+                              </a:rPr>
+                            </m:ctrlPr>
+                          </m:sSubPr>
+                          <m:e>
+                            <m:r>
+                              <a:rPr kumimoji="1" lang="en-US" altLang="zh-TW" sz="2300" b="0" i="1" smtClean="0">
+                                <a:solidFill>
+                                  <a:srgbClr val="C00000"/>
+                                </a:solidFill>
+                                <a:latin typeface="Cambria Math" panose="02040503050406030204" pitchFamily="18" charset="0"/>
+                              </a:rPr>
+                              <m:t>𝐶</m:t>
+                            </m:r>
+                          </m:e>
+                          <m:sub>
+                            <m:r>
+                              <a:rPr kumimoji="1" lang="en-US" altLang="zh-TW" sz="2300" b="0" i="1" smtClean="0">
+                                <a:solidFill>
+                                  <a:srgbClr val="C00000"/>
+                                </a:solidFill>
+                                <a:latin typeface="Cambria Math" panose="02040503050406030204" pitchFamily="18" charset="0"/>
+                              </a:rPr>
+                              <m:t>𝑖</m:t>
+                            </m:r>
+                            <m:r>
+                              <a:rPr kumimoji="1" lang="en-US" altLang="zh-TW" sz="2300" b="0" i="1" smtClean="0">
+                                <a:solidFill>
+                                  <a:srgbClr val="C00000"/>
+                                </a:solidFill>
+                                <a:latin typeface="Cambria Math" panose="02040503050406030204" pitchFamily="18" charset="0"/>
+                              </a:rPr>
+                              <m:t>−</m:t>
+                            </m:r>
+                            <m:r>
+                              <a:rPr kumimoji="1" lang="en-US" altLang="zh-TW" sz="2300" b="0" i="1" smtClean="0">
+                                <a:solidFill>
+                                  <a:srgbClr val="C00000"/>
+                                </a:solidFill>
+                                <a:latin typeface="Cambria Math" panose="02040503050406030204" pitchFamily="18" charset="0"/>
+                              </a:rPr>
+                              <m:t>𝑗</m:t>
+                            </m:r>
+                          </m:sub>
+                        </m:sSub>
+                      </m:e>
+                    </m:nary>
+                  </m:oMath>
+                </a14:m>
+                <a:endParaRPr kumimoji="1" lang="en-US" altLang="zh-TW" sz="2300" dirty="0">
+                  <a:solidFill>
+                    <a:srgbClr val="C00000"/>
+                  </a:solidFill>
+                </a:endParaRPr>
+              </a:p>
+              <a:p>
+                <a:endParaRPr kumimoji="1" lang="en-US" altLang="zh-TW" sz="2300" dirty="0">
+                  <a:solidFill>
+                    <a:srgbClr val="C00000"/>
+                  </a:solidFill>
+                </a:endParaRPr>
+              </a:p>
+              <a:p>
+                <a:endParaRPr kumimoji="1" lang="en-US" altLang="zh-TW" sz="2300" dirty="0">
+                  <a:solidFill>
+                    <a:srgbClr val="C00000"/>
+                  </a:solidFill>
+                </a:endParaRPr>
+              </a:p>
+              <a:p>
+                <a:r>
+                  <a:rPr kumimoji="1" lang="en-US" altLang="zh-TW" sz="2300" b="1" i="1" dirty="0">
+                    <a:solidFill>
+                      <a:srgbClr val="C00000"/>
+                    </a:solidFill>
+                  </a:rPr>
+                  <a:t>ESTR4999</a:t>
+                </a:r>
+                <a:r>
+                  <a:rPr kumimoji="1" lang="en-US" altLang="zh-TW" sz="2300" dirty="0">
+                    <a:solidFill>
+                      <a:srgbClr val="C00000"/>
+                    </a:solidFill>
+                  </a:rPr>
+                  <a:t>: </a:t>
+                </a:r>
+                <a14:m>
+                  <m:oMath xmlns:m="http://schemas.openxmlformats.org/officeDocument/2006/math">
+                    <m:acc>
+                      <m:accPr>
+                        <m:chr m:val="̂"/>
+                        <m:ctrlPr>
+                          <a:rPr kumimoji="1" lang="zh-TW" altLang="en-US" sz="2300" i="1">
+                            <a:solidFill>
+                              <a:srgbClr val="C00000"/>
+                            </a:solidFill>
+                            <a:latin typeface="Cambria Math" panose="02040503050406030204" pitchFamily="18" charset="0"/>
+                          </a:rPr>
+                        </m:ctrlPr>
+                      </m:accPr>
+                      <m:e>
+                        <m:sSub>
+                          <m:sSubPr>
+                            <m:ctrlPr>
+                              <a:rPr kumimoji="1" lang="en-US" altLang="zh-TW" sz="2300" i="1">
+                                <a:solidFill>
+                                  <a:srgbClr val="C00000"/>
+                                </a:solidFill>
+                                <a:latin typeface="Cambria Math" panose="02040503050406030204" pitchFamily="18" charset="0"/>
+                              </a:rPr>
+                            </m:ctrlPr>
+                          </m:sSubPr>
+                          <m:e>
+                            <m:r>
+                              <a:rPr kumimoji="1" lang="en-US" altLang="zh-TW" sz="2300" i="1">
+                                <a:solidFill>
+                                  <a:srgbClr val="C00000"/>
+                                </a:solidFill>
+                                <a:latin typeface="Cambria Math" panose="02040503050406030204" pitchFamily="18" charset="0"/>
+                              </a:rPr>
+                              <m:t>𝐶</m:t>
+                            </m:r>
+                          </m:e>
+                          <m:sub>
+                            <m:r>
+                              <a:rPr kumimoji="1" lang="en-US" altLang="zh-TW" sz="2300" i="1">
+                                <a:solidFill>
+                                  <a:srgbClr val="C00000"/>
+                                </a:solidFill>
+                                <a:latin typeface="Cambria Math" panose="02040503050406030204" pitchFamily="18" charset="0"/>
+                              </a:rPr>
+                              <m:t>𝑖</m:t>
+                            </m:r>
+                            <m:r>
+                              <a:rPr kumimoji="1" lang="en-US" altLang="zh-TW" sz="2300" i="1">
+                                <a:solidFill>
+                                  <a:srgbClr val="C00000"/>
+                                </a:solidFill>
+                                <a:latin typeface="Cambria Math" panose="02040503050406030204" pitchFamily="18" charset="0"/>
+                              </a:rPr>
+                              <m:t>+1</m:t>
+                            </m:r>
+                          </m:sub>
+                        </m:sSub>
+                      </m:e>
+                    </m:acc>
+                    <m:r>
+                      <a:rPr kumimoji="1" lang="en-US" altLang="zh-TW" sz="2300" i="1">
+                        <a:solidFill>
+                          <a:srgbClr val="C00000"/>
+                        </a:solidFill>
+                        <a:latin typeface="Cambria Math" panose="02040503050406030204" pitchFamily="18" charset="0"/>
+                      </a:rPr>
+                      <m:t>=</m:t>
+                    </m:r>
+                    <m:f>
+                      <m:fPr>
+                        <m:ctrlPr>
+                          <a:rPr kumimoji="1" lang="en-US" altLang="zh-TW" sz="2300" i="1">
+                            <a:solidFill>
+                              <a:srgbClr val="C00000"/>
+                            </a:solidFill>
+                            <a:latin typeface="Cambria Math" panose="02040503050406030204" pitchFamily="18" charset="0"/>
+                          </a:rPr>
+                        </m:ctrlPr>
+                      </m:fPr>
+                      <m:num>
+                        <m:r>
+                          <a:rPr kumimoji="1" lang="en-US" altLang="zh-TW" sz="2300" i="1">
+                            <a:solidFill>
+                              <a:srgbClr val="C00000"/>
+                            </a:solidFill>
+                            <a:latin typeface="Cambria Math" panose="02040503050406030204" pitchFamily="18" charset="0"/>
+                          </a:rPr>
+                          <m:t>1</m:t>
+                        </m:r>
+                      </m:num>
+                      <m:den>
+                        <m:r>
+                          <a:rPr kumimoji="1" lang="en-US" altLang="zh-TW" sz="2300" i="1">
+                            <a:solidFill>
+                              <a:srgbClr val="C00000"/>
+                            </a:solidFill>
+                            <a:latin typeface="Cambria Math" panose="02040503050406030204" pitchFamily="18" charset="0"/>
+                          </a:rPr>
+                          <m:t>𝐾</m:t>
+                        </m:r>
+                      </m:den>
+                    </m:f>
+                    <m:f>
+                      <m:fPr>
+                        <m:ctrlPr>
+                          <a:rPr kumimoji="1" lang="en-US" altLang="zh-TW" sz="2300" i="1" smtClean="0">
+                            <a:solidFill>
+                              <a:srgbClr val="C00000"/>
+                            </a:solidFill>
+                            <a:latin typeface="Cambria Math" panose="02040503050406030204" pitchFamily="18" charset="0"/>
+                          </a:rPr>
+                        </m:ctrlPr>
+                      </m:fPr>
+                      <m:num>
+                        <m:nary>
+                          <m:naryPr>
+                            <m:chr m:val="∑"/>
+                            <m:ctrlPr>
+                              <a:rPr kumimoji="1" lang="en-US" altLang="zh-TW" sz="2300" i="1">
+                                <a:solidFill>
+                                  <a:srgbClr val="C00000"/>
+                                </a:solidFill>
+                                <a:latin typeface="Cambria Math" panose="02040503050406030204" pitchFamily="18" charset="0"/>
+                              </a:rPr>
+                            </m:ctrlPr>
+                          </m:naryPr>
+                          <m:sub>
+                            <m:r>
+                              <m:rPr>
+                                <m:brk m:alnAt="23"/>
+                              </m:rPr>
+                              <a:rPr kumimoji="1" lang="en-US" altLang="zh-TW" sz="2300" i="1">
+                                <a:solidFill>
+                                  <a:srgbClr val="C00000"/>
+                                </a:solidFill>
+                                <a:latin typeface="Cambria Math" panose="02040503050406030204" pitchFamily="18" charset="0"/>
+                              </a:rPr>
+                              <m:t>𝑗</m:t>
+                            </m:r>
+                            <m:r>
+                              <a:rPr kumimoji="1" lang="en-US" altLang="zh-TW" sz="2300" i="1">
+                                <a:solidFill>
+                                  <a:srgbClr val="C00000"/>
+                                </a:solidFill>
+                                <a:latin typeface="Cambria Math" panose="02040503050406030204" pitchFamily="18" charset="0"/>
+                              </a:rPr>
+                              <m:t>=0</m:t>
+                            </m:r>
+                          </m:sub>
+                          <m:sup>
+                            <m:r>
+                              <a:rPr kumimoji="1" lang="en-US" altLang="zh-TW" sz="2300" i="1">
+                                <a:solidFill>
+                                  <a:srgbClr val="C00000"/>
+                                </a:solidFill>
+                                <a:latin typeface="Cambria Math" panose="02040503050406030204" pitchFamily="18" charset="0"/>
+                              </a:rPr>
+                              <m:t>𝐾</m:t>
+                            </m:r>
+                            <m:r>
+                              <a:rPr kumimoji="1" lang="en-US" altLang="zh-TW" sz="2300" i="1">
+                                <a:solidFill>
+                                  <a:srgbClr val="C00000"/>
+                                </a:solidFill>
+                                <a:latin typeface="Cambria Math" panose="02040503050406030204" pitchFamily="18" charset="0"/>
+                              </a:rPr>
+                              <m:t>−1</m:t>
+                            </m:r>
+                          </m:sup>
+                          <m:e>
+                            <m:sSub>
+                              <m:sSubPr>
+                                <m:ctrlPr>
+                                  <a:rPr kumimoji="1" lang="en-US" altLang="zh-TW" sz="2300" i="1" smtClean="0">
+                                    <a:solidFill>
+                                      <a:srgbClr val="C00000"/>
+                                    </a:solidFill>
+                                    <a:latin typeface="Cambria Math" panose="02040503050406030204" pitchFamily="18" charset="0"/>
+                                  </a:rPr>
+                                </m:ctrlPr>
+                              </m:sSubPr>
+                              <m:e>
+                                <m:r>
+                                  <a:rPr kumimoji="1" lang="en-US" altLang="zh-TW" sz="2300" b="0" i="1" smtClean="0">
+                                    <a:solidFill>
+                                      <a:srgbClr val="C00000"/>
+                                    </a:solidFill>
+                                    <a:latin typeface="Cambria Math" panose="02040503050406030204" pitchFamily="18" charset="0"/>
+                                  </a:rPr>
+                                  <m:t>𝑠</m:t>
+                                </m:r>
+                              </m:e>
+                              <m:sub>
+                                <m:r>
+                                  <a:rPr kumimoji="1" lang="en-US" altLang="zh-TW" sz="2300" b="0" i="1" smtClean="0">
+                                    <a:solidFill>
+                                      <a:srgbClr val="C00000"/>
+                                    </a:solidFill>
+                                    <a:latin typeface="Cambria Math" panose="02040503050406030204" pitchFamily="18" charset="0"/>
+                                  </a:rPr>
+                                  <m:t>𝑖</m:t>
+                                </m:r>
+                                <m:r>
+                                  <a:rPr kumimoji="1" lang="en-US" altLang="zh-TW" sz="2300" b="0" i="1" smtClean="0">
+                                    <a:solidFill>
+                                      <a:srgbClr val="C00000"/>
+                                    </a:solidFill>
+                                    <a:latin typeface="Cambria Math" panose="02040503050406030204" pitchFamily="18" charset="0"/>
+                                  </a:rPr>
+                                  <m:t>−</m:t>
+                                </m:r>
+                                <m:r>
+                                  <a:rPr kumimoji="1" lang="en-US" altLang="zh-TW" sz="2300" b="0" i="1" smtClean="0">
+                                    <a:solidFill>
+                                      <a:srgbClr val="C00000"/>
+                                    </a:solidFill>
+                                    <a:latin typeface="Cambria Math" panose="02040503050406030204" pitchFamily="18" charset="0"/>
+                                  </a:rPr>
+                                  <m:t>𝑗</m:t>
+                                </m:r>
+                              </m:sub>
+                            </m:sSub>
+                          </m:e>
+                        </m:nary>
+                      </m:num>
+                      <m:den>
+                        <m:nary>
+                          <m:naryPr>
+                            <m:chr m:val="∑"/>
+                            <m:ctrlPr>
+                              <a:rPr kumimoji="1" lang="en-US" altLang="zh-TW" sz="2300" i="1">
+                                <a:solidFill>
+                                  <a:srgbClr val="C00000"/>
+                                </a:solidFill>
+                                <a:latin typeface="Cambria Math" panose="02040503050406030204" pitchFamily="18" charset="0"/>
+                              </a:rPr>
+                            </m:ctrlPr>
+                          </m:naryPr>
+                          <m:sub>
+                            <m:r>
+                              <m:rPr>
+                                <m:brk m:alnAt="23"/>
+                              </m:rPr>
+                              <a:rPr kumimoji="1" lang="en-US" altLang="zh-TW" sz="2300" i="1">
+                                <a:solidFill>
+                                  <a:srgbClr val="C00000"/>
+                                </a:solidFill>
+                                <a:latin typeface="Cambria Math" panose="02040503050406030204" pitchFamily="18" charset="0"/>
+                              </a:rPr>
+                              <m:t>𝑗</m:t>
+                            </m:r>
+                            <m:r>
+                              <a:rPr kumimoji="1" lang="en-US" altLang="zh-TW" sz="2300" i="1">
+                                <a:solidFill>
+                                  <a:srgbClr val="C00000"/>
+                                </a:solidFill>
+                                <a:latin typeface="Cambria Math" panose="02040503050406030204" pitchFamily="18" charset="0"/>
+                              </a:rPr>
+                              <m:t>=0</m:t>
+                            </m:r>
+                          </m:sub>
+                          <m:sup>
+                            <m:r>
+                              <a:rPr kumimoji="1" lang="en-US" altLang="zh-TW" sz="2300" i="1">
+                                <a:solidFill>
+                                  <a:srgbClr val="C00000"/>
+                                </a:solidFill>
+                                <a:latin typeface="Cambria Math" panose="02040503050406030204" pitchFamily="18" charset="0"/>
+                              </a:rPr>
+                              <m:t>𝐾</m:t>
+                            </m:r>
+                            <m:r>
+                              <a:rPr kumimoji="1" lang="en-US" altLang="zh-TW" sz="2300" i="1">
+                                <a:solidFill>
+                                  <a:srgbClr val="C00000"/>
+                                </a:solidFill>
+                                <a:latin typeface="Cambria Math" panose="02040503050406030204" pitchFamily="18" charset="0"/>
+                              </a:rPr>
+                              <m:t>−1</m:t>
+                            </m:r>
+                          </m:sup>
+                          <m:e>
+                            <m:sSub>
+                              <m:sSubPr>
+                                <m:ctrlPr>
+                                  <a:rPr kumimoji="1" lang="en-US" altLang="zh-TW" sz="2300" i="1" smtClean="0">
+                                    <a:solidFill>
+                                      <a:srgbClr val="C00000"/>
+                                    </a:solidFill>
+                                    <a:latin typeface="Cambria Math" panose="02040503050406030204" pitchFamily="18" charset="0"/>
+                                  </a:rPr>
+                                </m:ctrlPr>
+                              </m:sSubPr>
+                              <m:e>
+                                <m:r>
+                                  <a:rPr kumimoji="1" lang="en-US" altLang="zh-TW" sz="2300" b="0" i="1" smtClean="0">
+                                    <a:solidFill>
+                                      <a:srgbClr val="C00000"/>
+                                    </a:solidFill>
+                                    <a:latin typeface="Cambria Math" panose="02040503050406030204" pitchFamily="18" charset="0"/>
+                                  </a:rPr>
+                                  <m:t>𝑡</m:t>
+                                </m:r>
+                              </m:e>
+                              <m:sub>
+                                <m:r>
+                                  <a:rPr kumimoji="1" lang="en-US" altLang="zh-TW" sz="2300" b="0" i="1" smtClean="0">
+                                    <a:solidFill>
+                                      <a:srgbClr val="C00000"/>
+                                    </a:solidFill>
+                                    <a:latin typeface="Cambria Math" panose="02040503050406030204" pitchFamily="18" charset="0"/>
+                                  </a:rPr>
+                                  <m:t>𝑖</m:t>
+                                </m:r>
+                                <m:r>
+                                  <a:rPr kumimoji="1" lang="en-US" altLang="zh-TW" sz="2300" b="0" i="1" smtClean="0">
+                                    <a:solidFill>
+                                      <a:srgbClr val="C00000"/>
+                                    </a:solidFill>
+                                    <a:latin typeface="Cambria Math" panose="02040503050406030204" pitchFamily="18" charset="0"/>
+                                  </a:rPr>
+                                  <m:t>−</m:t>
+                                </m:r>
+                                <m:r>
+                                  <a:rPr kumimoji="1" lang="en-US" altLang="zh-TW" sz="2300" b="0" i="1" smtClean="0">
+                                    <a:solidFill>
+                                      <a:srgbClr val="C00000"/>
+                                    </a:solidFill>
+                                    <a:latin typeface="Cambria Math" panose="02040503050406030204" pitchFamily="18" charset="0"/>
+                                  </a:rPr>
+                                  <m:t>𝑗</m:t>
+                                </m:r>
+                              </m:sub>
+                            </m:sSub>
+                          </m:e>
+                        </m:nary>
+                      </m:den>
+                    </m:f>
+                  </m:oMath>
+                </a14:m>
+                <a:endParaRPr kumimoji="1" lang="zh-TW" altLang="en-US" sz="2300" dirty="0">
+                  <a:solidFill>
+                    <a:srgbClr val="C00000"/>
+                  </a:solidFill>
+                </a:endParaRPr>
+              </a:p>
+            </p:txBody>
+          </p:sp>
+        </mc:Choice>
+        <mc:Fallback>
+          <p:sp>
+            <p:nvSpPr>
+              <p:cNvPr id="2" name="文字方塊 1">
+                <a:extLst>
+                  <a:ext uri="{FF2B5EF4-FFF2-40B4-BE49-F238E27FC236}">
+                    <a16:creationId xmlns:a16="http://schemas.microsoft.com/office/drawing/2014/main" id="{4612332E-D59E-A174-5EE8-EAEC4FCAB261}"/>
+                  </a:ext>
+                </a:extLst>
+              </p:cNvPr>
+              <p:cNvSpPr txBox="1">
+                <a:spLocks noRot="1" noChangeAspect="1" noMove="1" noResize="1" noEditPoints="1" noAdjustHandles="1" noChangeArrowheads="1" noChangeShapeType="1" noTextEdit="1"/>
+              </p:cNvSpPr>
+              <p:nvPr/>
+            </p:nvSpPr>
+            <p:spPr>
+              <a:xfrm>
+                <a:off x="8326167" y="365125"/>
+                <a:ext cx="3781168" cy="1934056"/>
+              </a:xfrm>
+              <a:prstGeom prst="rect">
+                <a:avLst/>
+              </a:prstGeom>
+              <a:blipFill>
+                <a:blip r:embed="rId5"/>
+                <a:stretch>
+                  <a:fillRect l="-4682" t="-27451" r="-334" b="-30719"/>
+                </a:stretch>
+              </a:blipFill>
+            </p:spPr>
+            <p:txBody>
+              <a:bodyPr/>
+              <a:lstStyle/>
+              <a:p>
+                <a:r>
+                  <a:rPr lang="zh-TW" altLang="en-US">
+                    <a:noFill/>
+                  </a:rPr>
+                  <a:t> </a:t>
+                </a:r>
+              </a:p>
+            </p:txBody>
+          </p:sp>
+        </mc:Fallback>
+      </mc:AlternateContent>
+      <p:cxnSp>
+        <p:nvCxnSpPr>
+          <p:cNvPr id="8" name="直線箭頭接點 7">
             <a:extLst>
               <a:ext uri="{FF2B5EF4-FFF2-40B4-BE49-F238E27FC236}">
-                <a16:creationId xmlns:a16="http://schemas.microsoft.com/office/drawing/2014/main" id="{EF7FE008-49BD-0C11-B7B1-D4F22BC3879F}"/>
+                <a16:creationId xmlns:a16="http://schemas.microsoft.com/office/drawing/2014/main" id="{CC1C98E5-9231-DAC4-C483-8EA2FEB19CC8}"/>
               </a:ext>
             </a:extLst>
           </p:cNvPr>
-          <p:cNvPicPr>
-            <a:picLocks noChangeAspect="1"/>
-          </p:cNvPicPr>
+          <p:cNvCxnSpPr>
+            <a:cxnSpLocks/>
+          </p:cNvCxnSpPr>
           <p:nvPr/>
-        </p:nvPicPr>
-        <p:blipFill>
-          <a:blip r:embed="rId4"/>
-          <a:stretch>
-            <a:fillRect/>
-          </a:stretch>
-        </p:blipFill>
+        </p:nvCxnSpPr>
         <p:spPr>
           <a:xfrm>
-            <a:off x="6096000" y="2952528"/>
-            <a:ext cx="5410806" cy="3812712"/>
+            <a:off x="8983362" y="921153"/>
+            <a:ext cx="0" cy="649550"/>
           </a:xfrm>
-          <a:prstGeom prst="rect">
+          <a:prstGeom prst="straightConnector1">
             <a:avLst/>
           </a:prstGeom>
+          <a:ln w="63500">
+            <a:tailEnd type="triangle"/>
+          </a:ln>
         </p:spPr>
-      </p:pic>
+        <p:style>
+          <a:lnRef idx="1">
+            <a:schemeClr val="accent2"/>
+          </a:lnRef>
+          <a:fillRef idx="0">
+            <a:schemeClr val="accent2"/>
+          </a:fillRef>
+          <a:effectRef idx="0">
+            <a:schemeClr val="accent2"/>
+          </a:effectRef>
+          <a:fontRef idx="minor">
+            <a:schemeClr val="tx1"/>
+          </a:fontRef>
+        </p:style>
+      </p:cxnSp>
+      <p:sp>
+        <p:nvSpPr>
+          <p:cNvPr id="11" name="投影片編號版面配置區 10">
+            <a:extLst>
+              <a:ext uri="{FF2B5EF4-FFF2-40B4-BE49-F238E27FC236}">
+                <a16:creationId xmlns:a16="http://schemas.microsoft.com/office/drawing/2014/main" id="{6F097619-6AA0-CD3F-66EE-273D5BE110FF}"/>
+              </a:ext>
+            </a:extLst>
+          </p:cNvPr>
+          <p:cNvSpPr>
+            <a:spLocks noGrp="1"/>
+          </p:cNvSpPr>
+          <p:nvPr>
+            <p:ph type="sldNum" sz="quarter" idx="12"/>
+          </p:nvPr>
+        </p:nvSpPr>
+        <p:spPr/>
+        <p:txBody>
+          <a:bodyPr/>
+          <a:lstStyle/>
+          <a:p>
+            <a:fld id="{EBC81C9E-5C6F-BE43-A2DB-9F7FDEA567D5}" type="slidenum">
+              <a:rPr kumimoji="1" lang="zh-TW" altLang="en-US" smtClean="0"/>
+              <a:t>4</a:t>
+            </a:fld>
+            <a:endParaRPr kumimoji="1" lang="zh-TW" altLang="en-US"/>
+          </a:p>
+        </p:txBody>
+      </p:sp>
     </p:spTree>
     <p:extLst>
       <p:ext uri="{BB962C8B-B14F-4D97-AF65-F5344CB8AC3E}">
@@ -8972,8 +10699,8 @@
           </a:p>
         </p:txBody>
       </p:sp>
-      <mc:AlternateContent xmlns:mc="http://schemas.openxmlformats.org/markup-compatibility/2006" xmlns:a14="http://schemas.microsoft.com/office/drawing/2010/main">
-        <mc:Choice Requires="a14">
+      <mc:AlternateContent xmlns:mc="http://schemas.openxmlformats.org/markup-compatibility/2006">
+        <mc:Choice xmlns:a14="http://schemas.microsoft.com/office/drawing/2010/main" Requires="a14">
           <p:sp>
             <p:nvSpPr>
               <p:cNvPr id="3" name="內容版面配置區 2">
@@ -9479,7 +11206,7 @@
                 </a:r>
                 <a:r>
                   <a:rPr kumimoji="1" lang="en-US" altLang="zh-TW" dirty="0"/>
-                  <a:t> around that range. And</a:t>
+                  <a:t> around that range (will be shown in the next page). And</a:t>
                 </a:r>
               </a:p>
               <a:p>
@@ -9511,7 +11238,7 @@
             </p:txBody>
           </p:sp>
         </mc:Choice>
-        <mc:Fallback xmlns="">
+        <mc:Fallback>
           <p:sp>
             <p:nvSpPr>
               <p:cNvPr id="3" name="內容版面配置區 2">
@@ -9555,6 +11282,35 @@
           </p:sp>
         </mc:Fallback>
       </mc:AlternateContent>
+      <p:sp>
+        <p:nvSpPr>
+          <p:cNvPr id="6" name="投影片編號版面配置區 5">
+            <a:extLst>
+              <a:ext uri="{FF2B5EF4-FFF2-40B4-BE49-F238E27FC236}">
+                <a16:creationId xmlns:a16="http://schemas.microsoft.com/office/drawing/2014/main" id="{1188D715-3B25-350A-CFBE-5F0BBE87CFB7}"/>
+              </a:ext>
+            </a:extLst>
+          </p:cNvPr>
+          <p:cNvSpPr>
+            <a:spLocks noGrp="1"/>
+          </p:cNvSpPr>
+          <p:nvPr>
+            <p:ph type="sldNum" sz="quarter" idx="12"/>
+          </p:nvPr>
+        </p:nvSpPr>
+        <p:spPr/>
+        <p:txBody>
+          <a:bodyPr/>
+          <a:lstStyle/>
+          <a:p>
+            <a:fld id="{EBC81C9E-5C6F-BE43-A2DB-9F7FDEA567D5}" type="slidenum">
+              <a:rPr kumimoji="1" lang="zh-TW" altLang="en-US" smtClean="0"/>
+              <a:t>5</a:t>
+            </a:fld>
+            <a:endParaRPr kumimoji="1" lang="zh-TW" altLang="en-US"/>
+          </a:p>
+        </p:txBody>
+      </p:sp>
     </p:spTree>
     <p:extLst>
       <p:ext uri="{BB962C8B-B14F-4D97-AF65-F5344CB8AC3E}">
@@ -9569,6 +11325,196 @@
 </file>
 
 <file path=ppt/slides/slide6.xml><?xml version="1.0" encoding="utf-8"?>
+<p:sld xmlns:a="http://schemas.openxmlformats.org/drawingml/2006/main" xmlns:r="http://schemas.openxmlformats.org/officeDocument/2006/relationships" xmlns:p="http://schemas.openxmlformats.org/presentationml/2006/main">
+  <p:cSld>
+    <p:spTree>
+      <p:nvGrpSpPr>
+        <p:cNvPr id="1" name=""/>
+        <p:cNvGrpSpPr/>
+        <p:nvPr/>
+      </p:nvGrpSpPr>
+      <p:grpSpPr>
+        <a:xfrm>
+          <a:off x="0" y="0"/>
+          <a:ext cx="0" cy="0"/>
+          <a:chOff x="0" y="0"/>
+          <a:chExt cx="0" cy="0"/>
+        </a:xfrm>
+      </p:grpSpPr>
+      <p:sp>
+        <p:nvSpPr>
+          <p:cNvPr id="2" name="標題 1">
+            <a:extLst>
+              <a:ext uri="{FF2B5EF4-FFF2-40B4-BE49-F238E27FC236}">
+                <a16:creationId xmlns:a16="http://schemas.microsoft.com/office/drawing/2014/main" id="{7956E4DA-9112-FBAE-51CC-5F06E18A08DC}"/>
+              </a:ext>
+            </a:extLst>
+          </p:cNvPr>
+          <p:cNvSpPr>
+            <a:spLocks noGrp="1"/>
+          </p:cNvSpPr>
+          <p:nvPr>
+            <p:ph type="title"/>
+          </p:nvPr>
+        </p:nvSpPr>
+        <p:spPr/>
+        <p:txBody>
+          <a:bodyPr>
+            <a:normAutofit/>
+          </a:bodyPr>
+          <a:lstStyle/>
+          <a:p>
+            <a:r>
+              <a:rPr kumimoji="1" lang="en-US" altLang="zh-TW" sz="3500" b="1" dirty="0">
+                <a:latin typeface="Times New Roman" panose="02020603050405020304" pitchFamily="18" charset="0"/>
+                <a:cs typeface="Times New Roman" panose="02020603050405020304" pitchFamily="18" charset="0"/>
+              </a:rPr>
+              <a:t>Current Status of Bandwidth Estimation</a:t>
+            </a:r>
+            <a:br>
+              <a:rPr kumimoji="1" lang="en-US" altLang="zh-TW" sz="3500" b="1" dirty="0">
+                <a:latin typeface="Times New Roman" panose="02020603050405020304" pitchFamily="18" charset="0"/>
+                <a:cs typeface="Times New Roman" panose="02020603050405020304" pitchFamily="18" charset="0"/>
+              </a:rPr>
+            </a:br>
+            <a:r>
+              <a:rPr kumimoji="1" lang="en-US" altLang="zh-TW" sz="3500" b="1" dirty="0">
+                <a:latin typeface="Times New Roman" panose="02020603050405020304" pitchFamily="18" charset="0"/>
+                <a:cs typeface="Times New Roman" panose="02020603050405020304" pitchFamily="18" charset="0"/>
+              </a:rPr>
+              <a:t>- </a:t>
+            </a:r>
+            <a:r>
+              <a:rPr kumimoji="1" lang="en-US" altLang="zh-TW" sz="3500" b="1" i="1" dirty="0">
+                <a:latin typeface="Times New Roman" panose="02020603050405020304" pitchFamily="18" charset="0"/>
+                <a:cs typeface="Times New Roman" panose="02020603050405020304" pitchFamily="18" charset="0"/>
+              </a:rPr>
+              <a:t>Arithmetic Mean</a:t>
+            </a:r>
+            <a:endParaRPr kumimoji="1" lang="zh-TW" altLang="en-US" sz="3500" b="1" i="1" dirty="0"/>
+          </a:p>
+        </p:txBody>
+      </p:sp>
+      <p:pic>
+        <p:nvPicPr>
+          <p:cNvPr id="4" name="圖片 3">
+            <a:extLst>
+              <a:ext uri="{FF2B5EF4-FFF2-40B4-BE49-F238E27FC236}">
+                <a16:creationId xmlns:a16="http://schemas.microsoft.com/office/drawing/2014/main" id="{4D2A902C-70A8-2D93-CC73-816904583900}"/>
+              </a:ext>
+            </a:extLst>
+          </p:cNvPr>
+          <p:cNvPicPr>
+            <a:picLocks noChangeAspect="1"/>
+          </p:cNvPicPr>
+          <p:nvPr/>
+        </p:nvPicPr>
+        <p:blipFill>
+          <a:blip r:embed="rId2"/>
+          <a:stretch>
+            <a:fillRect/>
+          </a:stretch>
+        </p:blipFill>
+        <p:spPr>
+          <a:xfrm>
+            <a:off x="4647371" y="1403014"/>
+            <a:ext cx="6757229" cy="5089861"/>
+          </a:xfrm>
+          <a:prstGeom prst="rect">
+            <a:avLst/>
+          </a:prstGeom>
+        </p:spPr>
+      </p:pic>
+      <p:sp>
+        <p:nvSpPr>
+          <p:cNvPr id="5" name="內容版面配置區 2">
+            <a:extLst>
+              <a:ext uri="{FF2B5EF4-FFF2-40B4-BE49-F238E27FC236}">
+                <a16:creationId xmlns:a16="http://schemas.microsoft.com/office/drawing/2014/main" id="{B3ACFAB7-ADC0-BFA1-D240-B98A623F2BF5}"/>
+              </a:ext>
+            </a:extLst>
+          </p:cNvPr>
+          <p:cNvSpPr>
+            <a:spLocks noGrp="1"/>
+          </p:cNvSpPr>
+          <p:nvPr>
+            <p:ph idx="1"/>
+          </p:nvPr>
+        </p:nvSpPr>
+        <p:spPr>
+          <a:xfrm>
+            <a:off x="838200" y="1865786"/>
+            <a:ext cx="3758371" cy="4340461"/>
+          </a:xfrm>
+        </p:spPr>
+        <p:txBody>
+          <a:bodyPr>
+            <a:normAutofit/>
+          </a:bodyPr>
+          <a:lstStyle/>
+          <a:p>
+            <a:r>
+              <a:rPr kumimoji="1" lang="en-US" altLang="zh-TW" dirty="0"/>
+              <a:t>On the RHS is a plot showing different algorithms’ normalized RMSE.</a:t>
+            </a:r>
+          </a:p>
+          <a:p>
+            <a:r>
+              <a:rPr kumimoji="1" lang="en-US" altLang="zh-TW" b="1" dirty="0"/>
+              <a:t>The normalized RMSE of the arithmetic mean is about 11%.</a:t>
+            </a:r>
+          </a:p>
+          <a:p>
+            <a:r>
+              <a:rPr kumimoji="1" lang="en-US" altLang="zh-TW" dirty="0"/>
+              <a:t>Certainly, these kinds of metrics vary from data sets.</a:t>
+            </a:r>
+          </a:p>
+        </p:txBody>
+      </p:sp>
+      <p:sp>
+        <p:nvSpPr>
+          <p:cNvPr id="6" name="投影片編號版面配置區 5">
+            <a:extLst>
+              <a:ext uri="{FF2B5EF4-FFF2-40B4-BE49-F238E27FC236}">
+                <a16:creationId xmlns:a16="http://schemas.microsoft.com/office/drawing/2014/main" id="{01A1C667-CA92-5DDE-E97E-C9E3BBAA4823}"/>
+              </a:ext>
+            </a:extLst>
+          </p:cNvPr>
+          <p:cNvSpPr>
+            <a:spLocks noGrp="1"/>
+          </p:cNvSpPr>
+          <p:nvPr>
+            <p:ph type="sldNum" sz="quarter" idx="12"/>
+          </p:nvPr>
+        </p:nvSpPr>
+        <p:spPr/>
+        <p:txBody>
+          <a:bodyPr/>
+          <a:lstStyle/>
+          <a:p>
+            <a:fld id="{EBC81C9E-5C6F-BE43-A2DB-9F7FDEA567D5}" type="slidenum">
+              <a:rPr kumimoji="1" lang="zh-TW" altLang="en-US" smtClean="0"/>
+              <a:t>6</a:t>
+            </a:fld>
+            <a:endParaRPr kumimoji="1" lang="zh-TW" altLang="en-US"/>
+          </a:p>
+        </p:txBody>
+      </p:sp>
+    </p:spTree>
+    <p:extLst>
+      <p:ext uri="{BB962C8B-B14F-4D97-AF65-F5344CB8AC3E}">
+        <p14:creationId xmlns:p14="http://schemas.microsoft.com/office/powerpoint/2010/main" val="3169672841"/>
+      </p:ext>
+    </p:extLst>
+  </p:cSld>
+  <p:clrMapOvr>
+    <a:masterClrMapping/>
+  </p:clrMapOvr>
+</p:sld>
+</file>
+
+<file path=ppt/slides/slide7.xml><?xml version="1.0" encoding="utf-8"?>
 <p:sld xmlns:a="http://schemas.openxmlformats.org/drawingml/2006/main" xmlns:r="http://schemas.openxmlformats.org/officeDocument/2006/relationships" xmlns:p="http://schemas.openxmlformats.org/presentationml/2006/main">
   <p:cSld>
     <p:spTree>
@@ -9631,7 +11577,7 @@
                 <a:latin typeface="Times New Roman" panose="02020603050405020304" pitchFamily="18" charset="0"/>
                 <a:cs typeface="Times New Roman" panose="02020603050405020304" pitchFamily="18" charset="0"/>
               </a:rPr>
-              <a:t>- Analysis on Frame Droppings</a:t>
+              <a:t>- Analysis on the Frame Droppings Condition</a:t>
             </a:r>
             <a:endParaRPr kumimoji="1" lang="zh-TW" altLang="en-US" sz="3500" b="1" dirty="0">
               <a:latin typeface="Times New Roman" panose="02020603050405020304" pitchFamily="18" charset="0"/>
@@ -12646,6 +14592,35 @@
           </p:sp>
         </mc:Fallback>
       </mc:AlternateContent>
+      <p:sp>
+        <p:nvSpPr>
+          <p:cNvPr id="2" name="投影片編號版面配置區 1">
+            <a:extLst>
+              <a:ext uri="{FF2B5EF4-FFF2-40B4-BE49-F238E27FC236}">
+                <a16:creationId xmlns:a16="http://schemas.microsoft.com/office/drawing/2014/main" id="{01FA6B2A-35F7-9154-FE8F-3852BE5737E4}"/>
+              </a:ext>
+            </a:extLst>
+          </p:cNvPr>
+          <p:cNvSpPr>
+            <a:spLocks noGrp="1"/>
+          </p:cNvSpPr>
+          <p:nvPr>
+            <p:ph type="sldNum" sz="quarter" idx="12"/>
+          </p:nvPr>
+        </p:nvSpPr>
+        <p:spPr/>
+        <p:txBody>
+          <a:bodyPr/>
+          <a:lstStyle/>
+          <a:p>
+            <a:fld id="{EBC81C9E-5C6F-BE43-A2DB-9F7FDEA567D5}" type="slidenum">
+              <a:rPr kumimoji="1" lang="zh-TW" altLang="en-US" smtClean="0"/>
+              <a:t>7</a:t>
+            </a:fld>
+            <a:endParaRPr kumimoji="1" lang="zh-TW" altLang="en-US"/>
+          </a:p>
+        </p:txBody>
+      </p:sp>
     </p:spTree>
     <p:extLst>
       <p:ext uri="{BB962C8B-B14F-4D97-AF65-F5344CB8AC3E}">
@@ -12659,7 +14634,7 @@
 </p:sld>
 </file>
 
-<file path=ppt/slides/slide7.xml><?xml version="1.0" encoding="utf-8"?>
+<file path=ppt/slides/slide8.xml><?xml version="1.0" encoding="utf-8"?>
 <p:sld xmlns:a="http://schemas.openxmlformats.org/drawingml/2006/main" xmlns:r="http://schemas.openxmlformats.org/officeDocument/2006/relationships" xmlns:p="http://schemas.openxmlformats.org/presentationml/2006/main">
   <p:cSld>
     <p:spTree>
@@ -13979,6 +15954,425 @@
           </p:sp>
         </mc:Fallback>
       </mc:AlternateContent>
+      <mc:AlternateContent xmlns:mc="http://schemas.openxmlformats.org/markup-compatibility/2006">
+        <mc:Choice xmlns:a14="http://schemas.microsoft.com/office/drawing/2010/main" Requires="a14">
+          <p:sp>
+            <p:nvSpPr>
+              <p:cNvPr id="4" name="文字方塊 3">
+                <a:extLst>
+                  <a:ext uri="{FF2B5EF4-FFF2-40B4-BE49-F238E27FC236}">
+                    <a16:creationId xmlns:a16="http://schemas.microsoft.com/office/drawing/2014/main" id="{A15696E9-E534-E67D-2471-B7B94E3AC81D}"/>
+                  </a:ext>
+                </a:extLst>
+              </p:cNvPr>
+              <p:cNvSpPr txBox="1"/>
+              <p:nvPr/>
+            </p:nvSpPr>
+            <p:spPr>
+              <a:xfrm>
+                <a:off x="8685901" y="5826395"/>
+                <a:ext cx="3351880" cy="608115"/>
+              </a:xfrm>
+              <a:prstGeom prst="rect">
+                <a:avLst/>
+              </a:prstGeom>
+              <a:noFill/>
+            </p:spPr>
+            <p:txBody>
+              <a:bodyPr wrap="none" lIns="0" tIns="0" rIns="0" bIns="0" rtlCol="0">
+                <a:spAutoFit/>
+              </a:bodyPr>
+              <a:lstStyle/>
+              <a:p>
+                <a14:m>
+                  <m:oMathPara xmlns:m="http://schemas.openxmlformats.org/officeDocument/2006/math">
+                    <m:oMathParaPr>
+                      <m:jc m:val="centerGroup"/>
+                    </m:oMathParaPr>
+                    <m:oMath xmlns:m="http://schemas.openxmlformats.org/officeDocument/2006/math">
+                      <m:r>
+                        <a:rPr lang="en-US" altLang="zh-TW" sz="2400" b="1" i="1" dirty="0" smtClean="0">
+                          <a:solidFill>
+                            <a:srgbClr val="C00000"/>
+                          </a:solidFill>
+                          <a:latin typeface="Cambria Math" panose="02040503050406030204" pitchFamily="18" charset="0"/>
+                        </a:rPr>
+                        <m:t>𝑷</m:t>
+                      </m:r>
+                      <m:d>
+                        <m:dPr>
+                          <m:ctrlPr>
+                            <a:rPr lang="en-US" altLang="zh-TW" sz="2400" b="1" i="1" dirty="0">
+                              <a:solidFill>
+                                <a:srgbClr val="C00000"/>
+                              </a:solidFill>
+                              <a:latin typeface="Cambria Math" panose="02040503050406030204" pitchFamily="18" charset="0"/>
+                            </a:rPr>
+                          </m:ctrlPr>
+                        </m:dPr>
+                        <m:e>
+                          <m:sSub>
+                            <m:sSubPr>
+                              <m:ctrlPr>
+                                <a:rPr kumimoji="1" lang="en-US" altLang="zh-TW" sz="2400" b="1" i="1">
+                                  <a:solidFill>
+                                    <a:srgbClr val="C00000"/>
+                                  </a:solidFill>
+                                  <a:latin typeface="Cambria Math" panose="02040503050406030204" pitchFamily="18" charset="0"/>
+                                </a:rPr>
+                              </m:ctrlPr>
+                            </m:sSubPr>
+                            <m:e>
+                              <m:r>
+                                <a:rPr kumimoji="1" lang="en-US" altLang="zh-TW" sz="2400" b="1" i="1">
+                                  <a:solidFill>
+                                    <a:srgbClr val="C00000"/>
+                                  </a:solidFill>
+                                  <a:latin typeface="Cambria Math" panose="02040503050406030204" pitchFamily="18" charset="0"/>
+                                </a:rPr>
+                                <m:t>𝑺</m:t>
+                              </m:r>
+                            </m:e>
+                            <m:sub>
+                              <m:sSub>
+                                <m:sSubPr>
+                                  <m:ctrlPr>
+                                    <a:rPr lang="en-US" altLang="zh-TW" sz="2400" b="1" i="1">
+                                      <a:solidFill>
+                                        <a:srgbClr val="C00000"/>
+                                      </a:solidFill>
+                                      <a:latin typeface="Cambria Math" panose="02040503050406030204" pitchFamily="18" charset="0"/>
+                                      <a:ea typeface="Cambria Math" panose="02040503050406030204" pitchFamily="18" charset="0"/>
+                                    </a:rPr>
+                                  </m:ctrlPr>
+                                </m:sSubPr>
+                                <m:e>
+                                  <m:r>
+                                    <a:rPr lang="en-US" altLang="zh-TW" sz="2400" b="1" i="1">
+                                      <a:solidFill>
+                                        <a:srgbClr val="C00000"/>
+                                      </a:solidFill>
+                                      <a:latin typeface="Cambria Math" panose="02040503050406030204" pitchFamily="18" charset="0"/>
+                                      <a:ea typeface="Cambria Math" panose="02040503050406030204" pitchFamily="18" charset="0"/>
+                                    </a:rPr>
+                                    <m:t>𝑻</m:t>
+                                  </m:r>
+                                </m:e>
+                                <m:sub>
+                                  <m:r>
+                                    <a:rPr lang="en-US" altLang="zh-TW" sz="2400" b="1" i="1">
+                                      <a:solidFill>
+                                        <a:srgbClr val="C00000"/>
+                                      </a:solidFill>
+                                      <a:latin typeface="Cambria Math" panose="02040503050406030204" pitchFamily="18" charset="0"/>
+                                      <a:ea typeface="Cambria Math" panose="02040503050406030204" pitchFamily="18" charset="0"/>
+                                    </a:rPr>
+                                    <m:t>𝒊</m:t>
+                                  </m:r>
+                                </m:sub>
+                              </m:sSub>
+                              <m:r>
+                                <a:rPr lang="en-US" altLang="zh-TW" sz="2400" b="1" i="1">
+                                  <a:solidFill>
+                                    <a:srgbClr val="C00000"/>
+                                  </a:solidFill>
+                                  <a:latin typeface="Cambria Math" panose="02040503050406030204" pitchFamily="18" charset="0"/>
+                                  <a:ea typeface="Cambria Math" panose="02040503050406030204" pitchFamily="18" charset="0"/>
+                                </a:rPr>
+                                <m:t>+</m:t>
+                              </m:r>
+                              <m:sSubSup>
+                                <m:sSubSupPr>
+                                  <m:ctrlPr>
+                                    <a:rPr lang="en-US" altLang="zh-TW" sz="2400" b="1" i="1">
+                                      <a:solidFill>
+                                        <a:srgbClr val="C00000"/>
+                                      </a:solidFill>
+                                      <a:latin typeface="Cambria Math" panose="02040503050406030204" pitchFamily="18" charset="0"/>
+                                      <a:ea typeface="Cambria Math" panose="02040503050406030204" pitchFamily="18" charset="0"/>
+                                    </a:rPr>
+                                  </m:ctrlPr>
+                                </m:sSubSupPr>
+                                <m:e>
+                                  <m:r>
+                                    <a:rPr lang="en-US" altLang="zh-TW" sz="2400" b="1" i="1">
+                                      <a:solidFill>
+                                        <a:srgbClr val="C00000"/>
+                                      </a:solidFill>
+                                      <a:latin typeface="Cambria Math" panose="02040503050406030204" pitchFamily="18" charset="0"/>
+                                      <a:ea typeface="Cambria Math" panose="02040503050406030204" pitchFamily="18" charset="0"/>
+                                    </a:rPr>
+                                    <m:t>𝒕</m:t>
+                                  </m:r>
+                                </m:e>
+                                <m:sub>
+                                  <m:r>
+                                    <a:rPr lang="en-US" altLang="zh-TW" sz="2400" b="1" i="1">
+                                      <a:solidFill>
+                                        <a:srgbClr val="C00000"/>
+                                      </a:solidFill>
+                                      <a:latin typeface="Cambria Math" panose="02040503050406030204" pitchFamily="18" charset="0"/>
+                                      <a:ea typeface="Cambria Math" panose="02040503050406030204" pitchFamily="18" charset="0"/>
+                                    </a:rPr>
+                                    <m:t>𝒃</m:t>
+                                  </m:r>
+                                </m:sub>
+                                <m:sup>
+                                  <m:d>
+                                    <m:dPr>
+                                      <m:ctrlPr>
+                                        <a:rPr lang="en-US" altLang="zh-TW" sz="2400" b="1" i="1">
+                                          <a:solidFill>
+                                            <a:srgbClr val="C00000"/>
+                                          </a:solidFill>
+                                          <a:latin typeface="Cambria Math" panose="02040503050406030204" pitchFamily="18" charset="0"/>
+                                          <a:ea typeface="Cambria Math" panose="02040503050406030204" pitchFamily="18" charset="0"/>
+                                        </a:rPr>
+                                      </m:ctrlPr>
+                                    </m:dPr>
+                                    <m:e>
+                                      <m:r>
+                                        <a:rPr lang="en-US" altLang="zh-TW" sz="2400" b="1" i="1">
+                                          <a:solidFill>
+                                            <a:srgbClr val="C00000"/>
+                                          </a:solidFill>
+                                          <a:latin typeface="Cambria Math" panose="02040503050406030204" pitchFamily="18" charset="0"/>
+                                          <a:ea typeface="Cambria Math" panose="02040503050406030204" pitchFamily="18" charset="0"/>
+                                        </a:rPr>
+                                        <m:t>𝒊</m:t>
+                                      </m:r>
+                                    </m:e>
+                                  </m:d>
+                                </m:sup>
+                              </m:sSubSup>
+                            </m:sub>
+                          </m:sSub>
+                          <m:r>
+                            <a:rPr lang="en-US" altLang="zh-TW" sz="2400" b="1" i="1">
+                              <a:solidFill>
+                                <a:srgbClr val="C00000"/>
+                              </a:solidFill>
+                              <a:latin typeface="Cambria Math" panose="02040503050406030204" pitchFamily="18" charset="0"/>
+                              <a:ea typeface="Cambria Math" panose="02040503050406030204" pitchFamily="18" charset="0"/>
+                            </a:rPr>
+                            <m:t>≥</m:t>
+                          </m:r>
+                          <m:sSub>
+                            <m:sSubPr>
+                              <m:ctrlPr>
+                                <a:rPr lang="en-US" altLang="zh-TW" sz="2400" b="1" i="1">
+                                  <a:solidFill>
+                                    <a:srgbClr val="C00000"/>
+                                  </a:solidFill>
+                                  <a:latin typeface="Cambria Math" panose="02040503050406030204" pitchFamily="18" charset="0"/>
+                                  <a:ea typeface="Cambria Math" panose="02040503050406030204" pitchFamily="18" charset="0"/>
+                                </a:rPr>
+                              </m:ctrlPr>
+                            </m:sSubPr>
+                            <m:e>
+                              <m:r>
+                                <a:rPr lang="en-US" altLang="zh-TW" sz="2400" b="1" i="1">
+                                  <a:solidFill>
+                                    <a:srgbClr val="C00000"/>
+                                  </a:solidFill>
+                                  <a:latin typeface="Cambria Math" panose="02040503050406030204" pitchFamily="18" charset="0"/>
+                                  <a:ea typeface="Cambria Math" panose="02040503050406030204" pitchFamily="18" charset="0"/>
+                                </a:rPr>
+                                <m:t>𝒔</m:t>
+                              </m:r>
+                            </m:e>
+                            <m:sub>
+                              <m:r>
+                                <a:rPr lang="en-US" altLang="zh-TW" sz="2400" b="1" i="1">
+                                  <a:solidFill>
+                                    <a:srgbClr val="C00000"/>
+                                  </a:solidFill>
+                                  <a:latin typeface="Cambria Math" panose="02040503050406030204" pitchFamily="18" charset="0"/>
+                                  <a:ea typeface="Cambria Math" panose="02040503050406030204" pitchFamily="18" charset="0"/>
+                                </a:rPr>
+                                <m:t>𝒊</m:t>
+                              </m:r>
+                            </m:sub>
+                          </m:sSub>
+                        </m:e>
+                      </m:d>
+                      <m:r>
+                        <a:rPr lang="en-US" altLang="zh-TW" sz="2400" b="1" i="1" smtClean="0">
+                          <a:solidFill>
+                            <a:srgbClr val="C00000"/>
+                          </a:solidFill>
+                          <a:latin typeface="Cambria Math" panose="02040503050406030204" pitchFamily="18" charset="0"/>
+                          <a:ea typeface="Cambria Math" panose="02040503050406030204" pitchFamily="18" charset="0"/>
+                        </a:rPr>
+                        <m:t>=</m:t>
+                      </m:r>
+                      <m:r>
+                        <a:rPr lang="en-US" altLang="zh-TW" sz="2400" b="1" i="1">
+                          <a:solidFill>
+                            <a:srgbClr val="C00000"/>
+                          </a:solidFill>
+                          <a:latin typeface="Cambria Math" panose="02040503050406030204" pitchFamily="18" charset="0"/>
+                          <a:ea typeface="Cambria Math" panose="02040503050406030204" pitchFamily="18" charset="0"/>
+                        </a:rPr>
+                        <m:t>𝟏</m:t>
+                      </m:r>
+                      <m:r>
+                        <a:rPr lang="en-US" altLang="zh-TW" sz="2400" b="1" i="1">
+                          <a:solidFill>
+                            <a:srgbClr val="C00000"/>
+                          </a:solidFill>
+                          <a:latin typeface="Cambria Math" panose="02040503050406030204" pitchFamily="18" charset="0"/>
+                          <a:ea typeface="Cambria Math" panose="02040503050406030204" pitchFamily="18" charset="0"/>
+                        </a:rPr>
+                        <m:t>−</m:t>
+                      </m:r>
+                      <m:r>
+                        <a:rPr lang="en-US" altLang="zh-TW" sz="2400" b="1" i="1">
+                          <a:solidFill>
+                            <a:srgbClr val="C00000"/>
+                          </a:solidFill>
+                          <a:latin typeface="Cambria Math" panose="02040503050406030204" pitchFamily="18" charset="0"/>
+                          <a:ea typeface="Cambria Math" panose="02040503050406030204" pitchFamily="18" charset="0"/>
+                        </a:rPr>
+                        <m:t>𝜺</m:t>
+                      </m:r>
+                      <m:r>
+                        <a:rPr lang="en-US" altLang="zh-TW" sz="2400" b="1" i="1">
+                          <a:solidFill>
+                            <a:srgbClr val="C00000"/>
+                          </a:solidFill>
+                          <a:latin typeface="Cambria Math" panose="02040503050406030204" pitchFamily="18" charset="0"/>
+                          <a:ea typeface="Cambria Math" panose="02040503050406030204" pitchFamily="18" charset="0"/>
+                        </a:rPr>
+                        <m:t>.</m:t>
+                      </m:r>
+                    </m:oMath>
+                  </m:oMathPara>
+                </a14:m>
+                <a:endParaRPr kumimoji="1" lang="zh-TW" altLang="en-US" sz="2400" dirty="0">
+                  <a:solidFill>
+                    <a:srgbClr val="C00000"/>
+                  </a:solidFill>
+                </a:endParaRPr>
+              </a:p>
+            </p:txBody>
+          </p:sp>
+        </mc:Choice>
+        <mc:Fallback>
+          <p:sp>
+            <p:nvSpPr>
+              <p:cNvPr id="4" name="文字方塊 3">
+                <a:extLst>
+                  <a:ext uri="{FF2B5EF4-FFF2-40B4-BE49-F238E27FC236}">
+                    <a16:creationId xmlns:a16="http://schemas.microsoft.com/office/drawing/2014/main" id="{A15696E9-E534-E67D-2471-B7B94E3AC81D}"/>
+                  </a:ext>
+                </a:extLst>
+              </p:cNvPr>
+              <p:cNvSpPr txBox="1">
+                <a:spLocks noRot="1" noChangeAspect="1" noMove="1" noResize="1" noEditPoints="1" noAdjustHandles="1" noChangeArrowheads="1" noChangeShapeType="1" noTextEdit="1"/>
+              </p:cNvSpPr>
+              <p:nvPr/>
+            </p:nvSpPr>
+            <p:spPr>
+              <a:xfrm>
+                <a:off x="8685901" y="5826395"/>
+                <a:ext cx="3351880" cy="608115"/>
+              </a:xfrm>
+              <a:prstGeom prst="rect">
+                <a:avLst/>
+              </a:prstGeom>
+              <a:blipFill>
+                <a:blip r:embed="rId3"/>
+                <a:stretch>
+                  <a:fillRect l="-1887" b="-10204"/>
+                </a:stretch>
+              </a:blipFill>
+            </p:spPr>
+            <p:txBody>
+              <a:bodyPr/>
+              <a:lstStyle/>
+              <a:p>
+                <a:r>
+                  <a:rPr lang="zh-TW" altLang="en-US">
+                    <a:noFill/>
+                  </a:rPr>
+                  <a:t> </a:t>
+                </a:r>
+              </a:p>
+            </p:txBody>
+          </p:sp>
+        </mc:Fallback>
+      </mc:AlternateContent>
+      <p:cxnSp>
+        <p:nvCxnSpPr>
+          <p:cNvPr id="5" name="直線箭頭接點 4">
+            <a:extLst>
+              <a:ext uri="{FF2B5EF4-FFF2-40B4-BE49-F238E27FC236}">
+                <a16:creationId xmlns:a16="http://schemas.microsoft.com/office/drawing/2014/main" id="{F7F5FE0F-F426-05E2-10FC-DC63165A5051}"/>
+              </a:ext>
+            </a:extLst>
+          </p:cNvPr>
+          <p:cNvCxnSpPr>
+            <a:cxnSpLocks/>
+          </p:cNvCxnSpPr>
+          <p:nvPr/>
+        </p:nvCxnSpPr>
+        <p:spPr>
+          <a:xfrm>
+            <a:off x="7863782" y="6434510"/>
+            <a:ext cx="822119" cy="0"/>
+          </a:xfrm>
+          <a:prstGeom prst="straightConnector1">
+            <a:avLst/>
+          </a:prstGeom>
+          <a:ln w="63500">
+            <a:tailEnd type="triangle"/>
+          </a:ln>
+        </p:spPr>
+        <p:style>
+          <a:lnRef idx="1">
+            <a:schemeClr val="accent2"/>
+          </a:lnRef>
+          <a:fillRef idx="0">
+            <a:schemeClr val="accent2"/>
+          </a:fillRef>
+          <a:effectRef idx="0">
+            <a:schemeClr val="accent2"/>
+          </a:effectRef>
+          <a:fontRef idx="minor">
+            <a:schemeClr val="tx1"/>
+          </a:fontRef>
+        </p:style>
+      </p:cxnSp>
+      <p:sp>
+        <p:nvSpPr>
+          <p:cNvPr id="7" name="投影片編號版面配置區 6">
+            <a:extLst>
+              <a:ext uri="{FF2B5EF4-FFF2-40B4-BE49-F238E27FC236}">
+                <a16:creationId xmlns:a16="http://schemas.microsoft.com/office/drawing/2014/main" id="{148D90EA-0330-7BC3-CD7B-60BEBF8AFE11}"/>
+              </a:ext>
+            </a:extLst>
+          </p:cNvPr>
+          <p:cNvSpPr>
+            <a:spLocks noGrp="1"/>
+          </p:cNvSpPr>
+          <p:nvPr>
+            <p:ph type="sldNum" sz="quarter" idx="12"/>
+          </p:nvPr>
+        </p:nvSpPr>
+        <p:spPr/>
+        <p:txBody>
+          <a:bodyPr/>
+          <a:lstStyle/>
+          <a:p>
+            <a:fld id="{EBC81C9E-5C6F-BE43-A2DB-9F7FDEA567D5}" type="slidenum">
+              <a:rPr kumimoji="1" lang="zh-TW" altLang="en-US" smtClean="0"/>
+              <a:t>8</a:t>
+            </a:fld>
+            <a:endParaRPr kumimoji="1" lang="zh-TW" altLang="en-US"/>
+          </a:p>
+        </p:txBody>
+      </p:sp>
     </p:spTree>
     <p:extLst>
       <p:ext uri="{BB962C8B-B14F-4D97-AF65-F5344CB8AC3E}">
@@ -13992,7 +16386,7 @@
 </p:sld>
 </file>
 
-<file path=ppt/slides/slide8.xml><?xml version="1.0" encoding="utf-8"?>
+<file path=ppt/slides/slide9.xml><?xml version="1.0" encoding="utf-8"?>
 <p:sld xmlns:a="http://schemas.openxmlformats.org/drawingml/2006/main" xmlns:r="http://schemas.openxmlformats.org/officeDocument/2006/relationships" xmlns:p="http://schemas.openxmlformats.org/presentationml/2006/main">
   <p:cSld>
     <p:spTree>
@@ -15183,42 +17577,12 @@
           </p:sp>
         </mc:Fallback>
       </mc:AlternateContent>
-    </p:spTree>
-    <p:extLst>
-      <p:ext uri="{BB962C8B-B14F-4D97-AF65-F5344CB8AC3E}">
-        <p14:creationId xmlns:p14="http://schemas.microsoft.com/office/powerpoint/2010/main" val="978772840"/>
-      </p:ext>
-    </p:extLst>
-  </p:cSld>
-  <p:clrMapOvr>
-    <a:masterClrMapping/>
-  </p:clrMapOvr>
-</p:sld>
-</file>
-
-<file path=ppt/slides/slide9.xml><?xml version="1.0" encoding="utf-8"?>
-<p:sld xmlns:a="http://schemas.openxmlformats.org/drawingml/2006/main" xmlns:r="http://schemas.openxmlformats.org/officeDocument/2006/relationships" xmlns:p="http://schemas.openxmlformats.org/presentationml/2006/main">
-  <p:cSld>
-    <p:spTree>
-      <p:nvGrpSpPr>
-        <p:cNvPr id="1" name=""/>
-        <p:cNvGrpSpPr/>
-        <p:nvPr/>
-      </p:nvGrpSpPr>
-      <p:grpSpPr>
-        <a:xfrm>
-          <a:off x="0" y="0"/>
-          <a:ext cx="0" cy="0"/>
-          <a:chOff x="0" y="0"/>
-          <a:chExt cx="0" cy="0"/>
-        </a:xfrm>
-      </p:grpSpPr>
       <p:sp>
         <p:nvSpPr>
-          <p:cNvPr id="2" name="標題 1">
+          <p:cNvPr id="4" name="投影片編號版面配置區 3">
             <a:extLst>
               <a:ext uri="{FF2B5EF4-FFF2-40B4-BE49-F238E27FC236}">
-                <a16:creationId xmlns:a16="http://schemas.microsoft.com/office/drawing/2014/main" id="{5FBAF32E-EDA2-5567-B28A-BD23B3A5D8C1}"/>
+                <a16:creationId xmlns:a16="http://schemas.microsoft.com/office/drawing/2014/main" id="{B2718E70-4626-2B3C-1EE5-38519DE5EE41}"/>
               </a:ext>
             </a:extLst>
           </p:cNvPr>
@@ -15226,618 +17590,26 @@
             <a:spLocks noGrp="1"/>
           </p:cNvSpPr>
           <p:nvPr>
-            <p:ph type="title"/>
+            <p:ph type="sldNum" sz="quarter" idx="12"/>
           </p:nvPr>
         </p:nvSpPr>
         <p:spPr/>
         <p:txBody>
-          <a:bodyPr>
-            <a:normAutofit fontScale="90000"/>
-          </a:bodyPr>
+          <a:bodyPr/>
           <a:lstStyle/>
           <a:p>
-            <a:r>
-              <a:rPr kumimoji="1" lang="en-US" altLang="zh-TW" b="1" dirty="0">
-                <a:latin typeface="Times New Roman" panose="02020603050405020304" pitchFamily="18" charset="0"/>
-                <a:cs typeface="Times New Roman" panose="02020603050405020304" pitchFamily="18" charset="0"/>
-              </a:rPr>
-              <a:t>Our Solution</a:t>
-            </a:r>
-            <a:br>
-              <a:rPr kumimoji="1" lang="en-US" altLang="zh-TW" b="1" dirty="0">
-                <a:latin typeface="Times New Roman" panose="02020603050405020304" pitchFamily="18" charset="0"/>
-                <a:cs typeface="Times New Roman" panose="02020603050405020304" pitchFamily="18" charset="0"/>
-              </a:rPr>
-            </a:br>
-            <a:r>
-              <a:rPr kumimoji="1" lang="en-US" altLang="zh-TW" b="1" dirty="0">
-                <a:latin typeface="Times New Roman" panose="02020603050405020304" pitchFamily="18" charset="0"/>
-                <a:cs typeface="Times New Roman" panose="02020603050405020304" pitchFamily="18" charset="0"/>
-              </a:rPr>
-              <a:t>- A Demo Picture of Conditional Distribution</a:t>
-            </a:r>
-            <a:endParaRPr kumimoji="1" lang="zh-TW" altLang="en-US" b="1" dirty="0">
-              <a:latin typeface="Times New Roman" panose="02020603050405020304" pitchFamily="18" charset="0"/>
-              <a:cs typeface="Times New Roman" panose="02020603050405020304" pitchFamily="18" charset="0"/>
-            </a:endParaRPr>
-          </a:p>
-        </p:txBody>
-      </p:sp>
-      <p:pic>
-        <p:nvPicPr>
-          <p:cNvPr id="15" name="圖片 14">
-            <a:extLst>
-              <a:ext uri="{FF2B5EF4-FFF2-40B4-BE49-F238E27FC236}">
-                <a16:creationId xmlns:a16="http://schemas.microsoft.com/office/drawing/2014/main" id="{69E76F6F-B539-6722-980A-B4910004E210}"/>
-              </a:ext>
-            </a:extLst>
-          </p:cNvPr>
-          <p:cNvPicPr>
-            <a:picLocks noChangeAspect="1"/>
-          </p:cNvPicPr>
-          <p:nvPr/>
-        </p:nvPicPr>
-        <p:blipFill>
-          <a:blip r:embed="rId2"/>
-          <a:stretch>
-            <a:fillRect/>
-          </a:stretch>
-        </p:blipFill>
-        <p:spPr>
-          <a:xfrm>
-            <a:off x="577088" y="1694181"/>
-            <a:ext cx="5424932" cy="4122558"/>
-          </a:xfrm>
-          <a:prstGeom prst="rect">
-            <a:avLst/>
-          </a:prstGeom>
-        </p:spPr>
-      </p:pic>
-      <p:pic>
-        <p:nvPicPr>
-          <p:cNvPr id="17" name="圖片 16">
-            <a:extLst>
-              <a:ext uri="{FF2B5EF4-FFF2-40B4-BE49-F238E27FC236}">
-                <a16:creationId xmlns:a16="http://schemas.microsoft.com/office/drawing/2014/main" id="{9D38A8B0-C3D6-5461-043E-DDA3310D2DCB}"/>
-              </a:ext>
-            </a:extLst>
-          </p:cNvPr>
-          <p:cNvPicPr>
-            <a:picLocks noChangeAspect="1"/>
-          </p:cNvPicPr>
-          <p:nvPr/>
-        </p:nvPicPr>
-        <p:blipFill>
-          <a:blip r:embed="rId3"/>
-          <a:stretch>
-            <a:fillRect/>
-          </a:stretch>
-        </p:blipFill>
-        <p:spPr>
-          <a:xfrm>
-            <a:off x="6120384" y="1743805"/>
-            <a:ext cx="5424932" cy="4056392"/>
-          </a:xfrm>
-          <a:prstGeom prst="rect">
-            <a:avLst/>
-          </a:prstGeom>
-        </p:spPr>
-      </p:pic>
-      <p:sp>
-        <p:nvSpPr>
-          <p:cNvPr id="18" name="內容版面配置區 2">
-            <a:extLst>
-              <a:ext uri="{FF2B5EF4-FFF2-40B4-BE49-F238E27FC236}">
-                <a16:creationId xmlns:a16="http://schemas.microsoft.com/office/drawing/2014/main" id="{57A183A6-C359-ABFA-76DC-BAF2CF96DD56}"/>
-              </a:ext>
-            </a:extLst>
-          </p:cNvPr>
-          <p:cNvSpPr txBox="1">
-            <a:spLocks/>
-          </p:cNvSpPr>
-          <p:nvPr/>
-        </p:nvSpPr>
-        <p:spPr>
-          <a:xfrm>
-            <a:off x="808736" y="5662299"/>
-            <a:ext cx="5287264" cy="376797"/>
-          </a:xfrm>
-          <a:prstGeom prst="rect">
-            <a:avLst/>
-          </a:prstGeom>
-        </p:spPr>
-        <p:txBody>
-          <a:bodyPr vert="horz" lIns="91440" tIns="45720" rIns="91440" bIns="45720" rtlCol="0">
-            <a:noAutofit/>
-          </a:bodyPr>
-          <a:lstStyle>
-            <a:lvl1pPr marL="228600" indent="-228600" algn="l" defTabSz="914400" rtl="0" eaLnBrk="1" latinLnBrk="0" hangingPunct="1">
-              <a:lnSpc>
-                <a:spcPct val="90000"/>
-              </a:lnSpc>
-              <a:spcBef>
-                <a:spcPts val="1000"/>
-              </a:spcBef>
-              <a:buFont typeface="Arial" panose="020B0604020202020204" pitchFamily="34" charset="0"/>
-              <a:buChar char="•"/>
-              <a:defRPr sz="2800" kern="1200">
-                <a:solidFill>
-                  <a:schemeClr val="tx1"/>
-                </a:solidFill>
-                <a:latin typeface="+mn-lt"/>
-                <a:ea typeface="+mn-ea"/>
-                <a:cs typeface="+mn-cs"/>
-              </a:defRPr>
-            </a:lvl1pPr>
-            <a:lvl2pPr marL="685800" indent="-228600" algn="l" defTabSz="914400" rtl="0" eaLnBrk="1" latinLnBrk="0" hangingPunct="1">
-              <a:lnSpc>
-                <a:spcPct val="90000"/>
-              </a:lnSpc>
-              <a:spcBef>
-                <a:spcPts val="500"/>
-              </a:spcBef>
-              <a:buFont typeface="Arial" panose="020B0604020202020204" pitchFamily="34" charset="0"/>
-              <a:buChar char="•"/>
-              <a:defRPr sz="2400" kern="1200">
-                <a:solidFill>
-                  <a:schemeClr val="tx1"/>
-                </a:solidFill>
-                <a:latin typeface="+mn-lt"/>
-                <a:ea typeface="+mn-ea"/>
-                <a:cs typeface="+mn-cs"/>
-              </a:defRPr>
-            </a:lvl2pPr>
-            <a:lvl3pPr marL="1143000" indent="-228600" algn="l" defTabSz="914400" rtl="0" eaLnBrk="1" latinLnBrk="0" hangingPunct="1">
-              <a:lnSpc>
-                <a:spcPct val="90000"/>
-              </a:lnSpc>
-              <a:spcBef>
-                <a:spcPts val="500"/>
-              </a:spcBef>
-              <a:buFont typeface="Arial" panose="020B0604020202020204" pitchFamily="34" charset="0"/>
-              <a:buChar char="•"/>
-              <a:defRPr sz="2000" kern="1200">
-                <a:solidFill>
-                  <a:schemeClr val="tx1"/>
-                </a:solidFill>
-                <a:latin typeface="+mn-lt"/>
-                <a:ea typeface="+mn-ea"/>
-                <a:cs typeface="+mn-cs"/>
-              </a:defRPr>
-            </a:lvl3pPr>
-            <a:lvl4pPr marL="1600200" indent="-228600" algn="l" defTabSz="914400" rtl="0" eaLnBrk="1" latinLnBrk="0" hangingPunct="1">
-              <a:lnSpc>
-                <a:spcPct val="90000"/>
-              </a:lnSpc>
-              <a:spcBef>
-                <a:spcPts val="500"/>
-              </a:spcBef>
-              <a:buFont typeface="Arial" panose="020B0604020202020204" pitchFamily="34" charset="0"/>
-              <a:buChar char="•"/>
-              <a:defRPr sz="1800" kern="1200">
-                <a:solidFill>
-                  <a:schemeClr val="tx1"/>
-                </a:solidFill>
-                <a:latin typeface="+mn-lt"/>
-                <a:ea typeface="+mn-ea"/>
-                <a:cs typeface="+mn-cs"/>
-              </a:defRPr>
-            </a:lvl4pPr>
-            <a:lvl5pPr marL="2057400" indent="-228600" algn="l" defTabSz="914400" rtl="0" eaLnBrk="1" latinLnBrk="0" hangingPunct="1">
-              <a:lnSpc>
-                <a:spcPct val="90000"/>
-              </a:lnSpc>
-              <a:spcBef>
-                <a:spcPts val="500"/>
-              </a:spcBef>
-              <a:buFont typeface="Arial" panose="020B0604020202020204" pitchFamily="34" charset="0"/>
-              <a:buChar char="•"/>
-              <a:defRPr sz="1800" kern="1200">
-                <a:solidFill>
-                  <a:schemeClr val="tx1"/>
-                </a:solidFill>
-                <a:latin typeface="+mn-lt"/>
-                <a:ea typeface="+mn-ea"/>
-                <a:cs typeface="+mn-cs"/>
-              </a:defRPr>
-            </a:lvl5pPr>
-            <a:lvl6pPr marL="2514600" indent="-228600" algn="l" defTabSz="914400" rtl="0" eaLnBrk="1" latinLnBrk="0" hangingPunct="1">
-              <a:lnSpc>
-                <a:spcPct val="90000"/>
-              </a:lnSpc>
-              <a:spcBef>
-                <a:spcPts val="500"/>
-              </a:spcBef>
-              <a:buFont typeface="Arial" panose="020B0604020202020204" pitchFamily="34" charset="0"/>
-              <a:buChar char="•"/>
-              <a:defRPr sz="1800" kern="1200">
-                <a:solidFill>
-                  <a:schemeClr val="tx1"/>
-                </a:solidFill>
-                <a:latin typeface="+mn-lt"/>
-                <a:ea typeface="+mn-ea"/>
-                <a:cs typeface="+mn-cs"/>
-              </a:defRPr>
-            </a:lvl6pPr>
-            <a:lvl7pPr marL="2971800" indent="-228600" algn="l" defTabSz="914400" rtl="0" eaLnBrk="1" latinLnBrk="0" hangingPunct="1">
-              <a:lnSpc>
-                <a:spcPct val="90000"/>
-              </a:lnSpc>
-              <a:spcBef>
-                <a:spcPts val="500"/>
-              </a:spcBef>
-              <a:buFont typeface="Arial" panose="020B0604020202020204" pitchFamily="34" charset="0"/>
-              <a:buChar char="•"/>
-              <a:defRPr sz="1800" kern="1200">
-                <a:solidFill>
-                  <a:schemeClr val="tx1"/>
-                </a:solidFill>
-                <a:latin typeface="+mn-lt"/>
-                <a:ea typeface="+mn-ea"/>
-                <a:cs typeface="+mn-cs"/>
-              </a:defRPr>
-            </a:lvl7pPr>
-            <a:lvl8pPr marL="3429000" indent="-228600" algn="l" defTabSz="914400" rtl="0" eaLnBrk="1" latinLnBrk="0" hangingPunct="1">
-              <a:lnSpc>
-                <a:spcPct val="90000"/>
-              </a:lnSpc>
-              <a:spcBef>
-                <a:spcPts val="500"/>
-              </a:spcBef>
-              <a:buFont typeface="Arial" panose="020B0604020202020204" pitchFamily="34" charset="0"/>
-              <a:buChar char="•"/>
-              <a:defRPr sz="1800" kern="1200">
-                <a:solidFill>
-                  <a:schemeClr val="tx1"/>
-                </a:solidFill>
-                <a:latin typeface="+mn-lt"/>
-                <a:ea typeface="+mn-ea"/>
-                <a:cs typeface="+mn-cs"/>
-              </a:defRPr>
-            </a:lvl8pPr>
-            <a:lvl9pPr marL="3886200" indent="-228600" algn="l" defTabSz="914400" rtl="0" eaLnBrk="1" latinLnBrk="0" hangingPunct="1">
-              <a:lnSpc>
-                <a:spcPct val="90000"/>
-              </a:lnSpc>
-              <a:spcBef>
-                <a:spcPts val="500"/>
-              </a:spcBef>
-              <a:buFont typeface="Arial" panose="020B0604020202020204" pitchFamily="34" charset="0"/>
-              <a:buChar char="•"/>
-              <a:defRPr sz="1800" kern="1200">
-                <a:solidFill>
-                  <a:schemeClr val="tx1"/>
-                </a:solidFill>
-                <a:latin typeface="+mn-lt"/>
-                <a:ea typeface="+mn-ea"/>
-                <a:cs typeface="+mn-cs"/>
-              </a:defRPr>
-            </a:lvl9pPr>
-          </a:lstStyle>
-          <a:p>
-            <a:r>
-              <a:rPr kumimoji="1" lang="en-US" altLang="zh-TW" sz="1600" dirty="0"/>
-              <a:t>An example of marginal empirical probability distribution.</a:t>
-            </a:r>
-          </a:p>
-        </p:txBody>
-      </p:sp>
-      <p:sp>
-        <p:nvSpPr>
-          <p:cNvPr id="19" name="內容版面配置區 2">
-            <a:extLst>
-              <a:ext uri="{FF2B5EF4-FFF2-40B4-BE49-F238E27FC236}">
-                <a16:creationId xmlns:a16="http://schemas.microsoft.com/office/drawing/2014/main" id="{DFC33640-BE19-0ABA-364B-5BCAE38ADC2E}"/>
-              </a:ext>
-            </a:extLst>
-          </p:cNvPr>
-          <p:cNvSpPr txBox="1">
-            <a:spLocks/>
-          </p:cNvSpPr>
-          <p:nvPr/>
-        </p:nvSpPr>
-        <p:spPr>
-          <a:xfrm>
-            <a:off x="6799580" y="5987506"/>
-            <a:ext cx="4745736" cy="376797"/>
-          </a:xfrm>
-          <a:prstGeom prst="rect">
-            <a:avLst/>
-          </a:prstGeom>
-        </p:spPr>
-        <p:txBody>
-          <a:bodyPr vert="horz" lIns="91440" tIns="45720" rIns="91440" bIns="45720" rtlCol="0">
-            <a:noAutofit/>
-          </a:bodyPr>
-          <a:lstStyle>
-            <a:lvl1pPr marL="228600" indent="-228600" algn="l" defTabSz="914400" rtl="0" eaLnBrk="1" latinLnBrk="0" hangingPunct="1">
-              <a:lnSpc>
-                <a:spcPct val="90000"/>
-              </a:lnSpc>
-              <a:spcBef>
-                <a:spcPts val="1000"/>
-              </a:spcBef>
-              <a:buFont typeface="Arial" panose="020B0604020202020204" pitchFamily="34" charset="0"/>
-              <a:buChar char="•"/>
-              <a:defRPr sz="2800" kern="1200">
-                <a:solidFill>
-                  <a:schemeClr val="tx1"/>
-                </a:solidFill>
-                <a:latin typeface="+mn-lt"/>
-                <a:ea typeface="+mn-ea"/>
-                <a:cs typeface="+mn-cs"/>
-              </a:defRPr>
-            </a:lvl1pPr>
-            <a:lvl2pPr marL="685800" indent="-228600" algn="l" defTabSz="914400" rtl="0" eaLnBrk="1" latinLnBrk="0" hangingPunct="1">
-              <a:lnSpc>
-                <a:spcPct val="90000"/>
-              </a:lnSpc>
-              <a:spcBef>
-                <a:spcPts val="500"/>
-              </a:spcBef>
-              <a:buFont typeface="Arial" panose="020B0604020202020204" pitchFamily="34" charset="0"/>
-              <a:buChar char="•"/>
-              <a:defRPr sz="2400" kern="1200">
-                <a:solidFill>
-                  <a:schemeClr val="tx1"/>
-                </a:solidFill>
-                <a:latin typeface="+mn-lt"/>
-                <a:ea typeface="+mn-ea"/>
-                <a:cs typeface="+mn-cs"/>
-              </a:defRPr>
-            </a:lvl2pPr>
-            <a:lvl3pPr marL="1143000" indent="-228600" algn="l" defTabSz="914400" rtl="0" eaLnBrk="1" latinLnBrk="0" hangingPunct="1">
-              <a:lnSpc>
-                <a:spcPct val="90000"/>
-              </a:lnSpc>
-              <a:spcBef>
-                <a:spcPts val="500"/>
-              </a:spcBef>
-              <a:buFont typeface="Arial" panose="020B0604020202020204" pitchFamily="34" charset="0"/>
-              <a:buChar char="•"/>
-              <a:defRPr sz="2000" kern="1200">
-                <a:solidFill>
-                  <a:schemeClr val="tx1"/>
-                </a:solidFill>
-                <a:latin typeface="+mn-lt"/>
-                <a:ea typeface="+mn-ea"/>
-                <a:cs typeface="+mn-cs"/>
-              </a:defRPr>
-            </a:lvl3pPr>
-            <a:lvl4pPr marL="1600200" indent="-228600" algn="l" defTabSz="914400" rtl="0" eaLnBrk="1" latinLnBrk="0" hangingPunct="1">
-              <a:lnSpc>
-                <a:spcPct val="90000"/>
-              </a:lnSpc>
-              <a:spcBef>
-                <a:spcPts val="500"/>
-              </a:spcBef>
-              <a:buFont typeface="Arial" panose="020B0604020202020204" pitchFamily="34" charset="0"/>
-              <a:buChar char="•"/>
-              <a:defRPr sz="1800" kern="1200">
-                <a:solidFill>
-                  <a:schemeClr val="tx1"/>
-                </a:solidFill>
-                <a:latin typeface="+mn-lt"/>
-                <a:ea typeface="+mn-ea"/>
-                <a:cs typeface="+mn-cs"/>
-              </a:defRPr>
-            </a:lvl4pPr>
-            <a:lvl5pPr marL="2057400" indent="-228600" algn="l" defTabSz="914400" rtl="0" eaLnBrk="1" latinLnBrk="0" hangingPunct="1">
-              <a:lnSpc>
-                <a:spcPct val="90000"/>
-              </a:lnSpc>
-              <a:spcBef>
-                <a:spcPts val="500"/>
-              </a:spcBef>
-              <a:buFont typeface="Arial" panose="020B0604020202020204" pitchFamily="34" charset="0"/>
-              <a:buChar char="•"/>
-              <a:defRPr sz="1800" kern="1200">
-                <a:solidFill>
-                  <a:schemeClr val="tx1"/>
-                </a:solidFill>
-                <a:latin typeface="+mn-lt"/>
-                <a:ea typeface="+mn-ea"/>
-                <a:cs typeface="+mn-cs"/>
-              </a:defRPr>
-            </a:lvl5pPr>
-            <a:lvl6pPr marL="2514600" indent="-228600" algn="l" defTabSz="914400" rtl="0" eaLnBrk="1" latinLnBrk="0" hangingPunct="1">
-              <a:lnSpc>
-                <a:spcPct val="90000"/>
-              </a:lnSpc>
-              <a:spcBef>
-                <a:spcPts val="500"/>
-              </a:spcBef>
-              <a:buFont typeface="Arial" panose="020B0604020202020204" pitchFamily="34" charset="0"/>
-              <a:buChar char="•"/>
-              <a:defRPr sz="1800" kern="1200">
-                <a:solidFill>
-                  <a:schemeClr val="tx1"/>
-                </a:solidFill>
-                <a:latin typeface="+mn-lt"/>
-                <a:ea typeface="+mn-ea"/>
-                <a:cs typeface="+mn-cs"/>
-              </a:defRPr>
-            </a:lvl6pPr>
-            <a:lvl7pPr marL="2971800" indent="-228600" algn="l" defTabSz="914400" rtl="0" eaLnBrk="1" latinLnBrk="0" hangingPunct="1">
-              <a:lnSpc>
-                <a:spcPct val="90000"/>
-              </a:lnSpc>
-              <a:spcBef>
-                <a:spcPts val="500"/>
-              </a:spcBef>
-              <a:buFont typeface="Arial" panose="020B0604020202020204" pitchFamily="34" charset="0"/>
-              <a:buChar char="•"/>
-              <a:defRPr sz="1800" kern="1200">
-                <a:solidFill>
-                  <a:schemeClr val="tx1"/>
-                </a:solidFill>
-                <a:latin typeface="+mn-lt"/>
-                <a:ea typeface="+mn-ea"/>
-                <a:cs typeface="+mn-cs"/>
-              </a:defRPr>
-            </a:lvl7pPr>
-            <a:lvl8pPr marL="3429000" indent="-228600" algn="l" defTabSz="914400" rtl="0" eaLnBrk="1" latinLnBrk="0" hangingPunct="1">
-              <a:lnSpc>
-                <a:spcPct val="90000"/>
-              </a:lnSpc>
-              <a:spcBef>
-                <a:spcPts val="500"/>
-              </a:spcBef>
-              <a:buFont typeface="Arial" panose="020B0604020202020204" pitchFamily="34" charset="0"/>
-              <a:buChar char="•"/>
-              <a:defRPr sz="1800" kern="1200">
-                <a:solidFill>
-                  <a:schemeClr val="tx1"/>
-                </a:solidFill>
-                <a:latin typeface="+mn-lt"/>
-                <a:ea typeface="+mn-ea"/>
-                <a:cs typeface="+mn-cs"/>
-              </a:defRPr>
-            </a:lvl8pPr>
-            <a:lvl9pPr marL="3886200" indent="-228600" algn="l" defTabSz="914400" rtl="0" eaLnBrk="1" latinLnBrk="0" hangingPunct="1">
-              <a:lnSpc>
-                <a:spcPct val="90000"/>
-              </a:lnSpc>
-              <a:spcBef>
-                <a:spcPts val="500"/>
-              </a:spcBef>
-              <a:buFont typeface="Arial" panose="020B0604020202020204" pitchFamily="34" charset="0"/>
-              <a:buChar char="•"/>
-              <a:defRPr sz="1800" kern="1200">
-                <a:solidFill>
-                  <a:schemeClr val="tx1"/>
-                </a:solidFill>
-                <a:latin typeface="+mn-lt"/>
-                <a:ea typeface="+mn-ea"/>
-                <a:cs typeface="+mn-cs"/>
-              </a:defRPr>
-            </a:lvl9pPr>
-          </a:lstStyle>
-          <a:p>
-            <a:r>
-              <a:rPr kumimoji="1" lang="en-US" altLang="zh-TW" sz="1600" dirty="0"/>
-              <a:t>The corresponding conditional empirical distribution.</a:t>
-            </a:r>
-          </a:p>
-        </p:txBody>
-      </p:sp>
-      <p:cxnSp>
-        <p:nvCxnSpPr>
-          <p:cNvPr id="23" name="直線箭頭接點 22">
-            <a:extLst>
-              <a:ext uri="{FF2B5EF4-FFF2-40B4-BE49-F238E27FC236}">
-                <a16:creationId xmlns:a16="http://schemas.microsoft.com/office/drawing/2014/main" id="{2A038201-D989-B777-FC2C-C254BE19E985}"/>
-              </a:ext>
-            </a:extLst>
-          </p:cNvPr>
-          <p:cNvCxnSpPr>
-            <a:cxnSpLocks/>
-          </p:cNvCxnSpPr>
-          <p:nvPr/>
-        </p:nvCxnSpPr>
-        <p:spPr>
-          <a:xfrm>
-            <a:off x="5057583" y="6544510"/>
-            <a:ext cx="1669415" cy="0"/>
-          </a:xfrm>
-          <a:prstGeom prst="straightConnector1">
-            <a:avLst/>
-          </a:prstGeom>
-          <a:ln w="63500">
-            <a:tailEnd type="triangle"/>
-          </a:ln>
-        </p:spPr>
-        <p:style>
-          <a:lnRef idx="1">
-            <a:schemeClr val="accent2"/>
-          </a:lnRef>
-          <a:fillRef idx="0">
-            <a:schemeClr val="accent2"/>
-          </a:fillRef>
-          <a:effectRef idx="0">
-            <a:schemeClr val="accent2"/>
-          </a:effectRef>
-          <a:fontRef idx="minor">
-            <a:schemeClr val="tx1"/>
-          </a:fontRef>
-        </p:style>
-      </p:cxnSp>
-      <p:sp>
-        <p:nvSpPr>
-          <p:cNvPr id="27" name="文字方塊 26">
-            <a:extLst>
-              <a:ext uri="{FF2B5EF4-FFF2-40B4-BE49-F238E27FC236}">
-                <a16:creationId xmlns:a16="http://schemas.microsoft.com/office/drawing/2014/main" id="{487A6DA9-BCE6-2E71-D899-6DD8E90178E4}"/>
-              </a:ext>
-            </a:extLst>
-          </p:cNvPr>
-          <p:cNvSpPr txBox="1"/>
-          <p:nvPr/>
-        </p:nvSpPr>
-        <p:spPr>
-          <a:xfrm>
-            <a:off x="5203096" y="6064296"/>
-            <a:ext cx="1378391" cy="369332"/>
-          </a:xfrm>
-          <a:prstGeom prst="rect">
-            <a:avLst/>
-          </a:prstGeom>
-          <a:noFill/>
-        </p:spPr>
-        <p:txBody>
-          <a:bodyPr wrap="none" rtlCol="0">
-            <a:spAutoFit/>
-          </a:bodyPr>
-          <a:lstStyle/>
-          <a:p>
-            <a:r>
-              <a:rPr kumimoji="1" lang="en-US" altLang="zh-TW" b="1" i="1" dirty="0"/>
-              <a:t>conditioning</a:t>
-            </a:r>
-            <a:endParaRPr kumimoji="1" lang="zh-TW" altLang="en-US" b="1" i="1" dirty="0"/>
-          </a:p>
-        </p:txBody>
-      </p:sp>
-      <p:sp>
-        <p:nvSpPr>
-          <p:cNvPr id="29" name="文字方塊 28">
-            <a:extLst>
-              <a:ext uri="{FF2B5EF4-FFF2-40B4-BE49-F238E27FC236}">
-                <a16:creationId xmlns:a16="http://schemas.microsoft.com/office/drawing/2014/main" id="{C5D39DC8-74FE-0013-DE88-E4203B6915F6}"/>
-              </a:ext>
-            </a:extLst>
-          </p:cNvPr>
-          <p:cNvSpPr txBox="1"/>
-          <p:nvPr/>
-        </p:nvSpPr>
-        <p:spPr>
-          <a:xfrm>
-            <a:off x="7160615" y="5691921"/>
-            <a:ext cx="1611275" cy="307777"/>
-          </a:xfrm>
-          <a:prstGeom prst="rect">
-            <a:avLst/>
-          </a:prstGeom>
-          <a:noFill/>
-        </p:spPr>
-        <p:txBody>
-          <a:bodyPr wrap="none" rtlCol="0">
-            <a:spAutoFit/>
-          </a:bodyPr>
-          <a:lstStyle/>
-          <a:p>
-            <a:r>
-              <a:rPr kumimoji="1" lang="en-US" altLang="zh-TW" sz="1400" b="1" i="1" dirty="0"/>
-              <a:t>0.05 quantile value</a:t>
-            </a:r>
-            <a:endParaRPr kumimoji="1" lang="zh-TW" altLang="en-US" sz="1400" b="1" i="1" dirty="0"/>
+            <a:fld id="{EBC81C9E-5C6F-BE43-A2DB-9F7FDEA567D5}" type="slidenum">
+              <a:rPr kumimoji="1" lang="zh-TW" altLang="en-US" smtClean="0"/>
+              <a:t>9</a:t>
+            </a:fld>
+            <a:endParaRPr kumimoji="1" lang="zh-TW" altLang="en-US"/>
           </a:p>
         </p:txBody>
       </p:sp>
     </p:spTree>
     <p:extLst>
       <p:ext uri="{BB962C8B-B14F-4D97-AF65-F5344CB8AC3E}">
-        <p14:creationId xmlns:p14="http://schemas.microsoft.com/office/powerpoint/2010/main" val="2351825874"/>
+        <p14:creationId xmlns:p14="http://schemas.microsoft.com/office/powerpoint/2010/main" val="978772840"/>
       </p:ext>
     </p:extLst>
   </p:cSld>

</xml_diff>

<commit_message>
after final oral presentation
</commit_message>
<xml_diff>
--- a/ESTR4999_Notes/ESTR4999_Presentation.pptx
+++ b/ESTR4999_Notes/ESTR4999_Presentation.pptx
@@ -3873,7 +3873,7 @@
               <a:t>: </a:t>
             </a:r>
             <a:r>
-              <a:rPr kumimoji="1" lang="en-US" altLang="zh-TW" sz="1800">
+              <a:rPr kumimoji="1" lang="en-US" altLang="zh-TW" sz="1800" dirty="0" err="1">
                 <a:latin typeface="Times New Roman" panose="02020603050405020304" pitchFamily="18" charset="0"/>
                 <a:ea typeface="STSong" panose="02010600040101010101" pitchFamily="2" charset="-122"/>
                 <a:cs typeface="Times New Roman" panose="02020603050405020304" pitchFamily="18" charset="0"/>
@@ -3933,12 +3933,20 @@
           </a:p>
           <a:p>
             <a:r>
+              <a:rPr kumimoji="1" lang="en-US" altLang="zh-TW" sz="2800" b="1">
+                <a:latin typeface="Times New Roman" panose="02020603050405020304" pitchFamily="18" charset="0"/>
+                <a:ea typeface="STSong" panose="02010600040101010101" pitchFamily="2" charset="-122"/>
+                <a:cs typeface="Times New Roman" panose="02020603050405020304" pitchFamily="18" charset="0"/>
+              </a:rPr>
+              <a:t>April 26, </a:t>
+            </a:r>
+            <a:r>
               <a:rPr kumimoji="1" lang="en-US" altLang="zh-TW" sz="2800" b="1" dirty="0">
                 <a:latin typeface="Times New Roman" panose="02020603050405020304" pitchFamily="18" charset="0"/>
                 <a:ea typeface="STSong" panose="02010600040101010101" pitchFamily="2" charset="-122"/>
                 <a:cs typeface="Times New Roman" panose="02020603050405020304" pitchFamily="18" charset="0"/>
               </a:rPr>
-              <a:t>April 25, 2022</a:t>
+              <a:t>2022</a:t>
             </a:r>
           </a:p>
           <a:p>
@@ -11615,8 +11623,8 @@
           </a:p>
         </p:txBody>
       </p:sp>
-      <mc:AlternateContent xmlns:mc="http://schemas.openxmlformats.org/markup-compatibility/2006" xmlns:a14="http://schemas.microsoft.com/office/drawing/2010/main">
-        <mc:Choice Requires="a14">
+      <mc:AlternateContent xmlns:mc="http://schemas.openxmlformats.org/markup-compatibility/2006">
+        <mc:Choice xmlns:a14="http://schemas.microsoft.com/office/drawing/2010/main" Requires="a14">
           <p:sp>
             <p:nvSpPr>
               <p:cNvPr id="52" name="內容版面配置區 2">
@@ -12057,68 +12065,74 @@
                       </a:rPr>
                       <m:t>+</m:t>
                     </m:r>
-                    <m:sSub>
-                      <m:sSubPr>
+                    <m:f>
+                      <m:fPr>
                         <m:ctrlPr>
                           <a:rPr lang="en-US" altLang="zh-TW" sz="2200" b="1" i="1" smtClean="0">
                             <a:latin typeface="Cambria Math" panose="02040503050406030204" pitchFamily="18" charset="0"/>
                           </a:rPr>
                         </m:ctrlPr>
-                      </m:sSubPr>
-                      <m:e>
-                        <m:r>
-                          <a:rPr lang="en-US" altLang="zh-TW" sz="2200" b="1" i="1" smtClean="0">
-                            <a:latin typeface="Cambria Math" panose="02040503050406030204" pitchFamily="18" charset="0"/>
-                          </a:rPr>
-                          <m:t>𝒔</m:t>
-                        </m:r>
-                      </m:e>
-                      <m:sub>
-                        <m:r>
-                          <a:rPr lang="en-US" altLang="zh-TW" sz="2200" b="1" i="1" smtClean="0">
-                            <a:latin typeface="Cambria Math" panose="02040503050406030204" pitchFamily="18" charset="0"/>
-                          </a:rPr>
-                          <m:t>𝒊</m:t>
-                        </m:r>
-                      </m:sub>
-                    </m:sSub>
+                      </m:fPr>
+                      <m:num>
+                        <m:sSub>
+                          <m:sSubPr>
+                            <m:ctrlPr>
+                              <a:rPr lang="en-US" altLang="zh-TW" sz="2200" b="1" i="1" smtClean="0">
+                                <a:latin typeface="Cambria Math" panose="02040503050406030204" pitchFamily="18" charset="0"/>
+                              </a:rPr>
+                            </m:ctrlPr>
+                          </m:sSubPr>
+                          <m:e>
+                            <m:r>
+                              <a:rPr lang="en-US" altLang="zh-TW" sz="2200" b="1" i="1" smtClean="0">
+                                <a:latin typeface="Cambria Math" panose="02040503050406030204" pitchFamily="18" charset="0"/>
+                              </a:rPr>
+                              <m:t>𝒔</m:t>
+                            </m:r>
+                          </m:e>
+                          <m:sub>
+                            <m:r>
+                              <a:rPr lang="en-US" altLang="zh-TW" sz="2200" b="1" i="1" smtClean="0">
+                                <a:latin typeface="Cambria Math" panose="02040503050406030204" pitchFamily="18" charset="0"/>
+                              </a:rPr>
+                              <m:t>𝒊</m:t>
+                            </m:r>
+                          </m:sub>
+                        </m:sSub>
+                      </m:num>
+                      <m:den>
+                        <m:sSub>
+                          <m:sSubPr>
+                            <m:ctrlPr>
+                              <a:rPr lang="en-US" altLang="zh-TW" sz="2200" b="1" i="1" smtClean="0">
+                                <a:latin typeface="Cambria Math" panose="02040503050406030204" pitchFamily="18" charset="0"/>
+                              </a:rPr>
+                            </m:ctrlPr>
+                          </m:sSubPr>
+                          <m:e>
+                            <m:r>
+                              <a:rPr lang="en-US" altLang="zh-TW" sz="2200" b="1" i="1" smtClean="0">
+                                <a:latin typeface="Cambria Math" panose="02040503050406030204" pitchFamily="18" charset="0"/>
+                              </a:rPr>
+                              <m:t>𝑪</m:t>
+                            </m:r>
+                          </m:e>
+                          <m:sub>
+                            <m:r>
+                              <a:rPr lang="en-US" altLang="zh-TW" sz="2200" b="1" i="1" smtClean="0">
+                                <a:latin typeface="Cambria Math" panose="02040503050406030204" pitchFamily="18" charset="0"/>
+                              </a:rPr>
+                              <m:t>𝒊</m:t>
+                            </m:r>
+                          </m:sub>
+                        </m:sSub>
+                      </m:den>
+                    </m:f>
                     <m:r>
                       <a:rPr lang="en-US" altLang="zh-TW" sz="2200" b="1" i="1" smtClean="0">
                         <a:latin typeface="Cambria Math" panose="02040503050406030204" pitchFamily="18" charset="0"/>
                       </a:rPr>
-                      <m:t>/</m:t>
-                    </m:r>
-                    <m:sSub>
-                      <m:sSubPr>
-                        <m:ctrlPr>
-                          <a:rPr lang="en-US" altLang="zh-TW" sz="2200" b="1" i="1" smtClean="0">
-                            <a:latin typeface="Cambria Math" panose="02040503050406030204" pitchFamily="18" charset="0"/>
-                          </a:rPr>
-                        </m:ctrlPr>
-                      </m:sSubPr>
-                      <m:e>
-                        <m:r>
-                          <a:rPr lang="en-US" altLang="zh-TW" sz="2200" b="1" i="1" smtClean="0">
-                            <a:latin typeface="Cambria Math" panose="02040503050406030204" pitchFamily="18" charset="0"/>
-                          </a:rPr>
-                          <m:t>𝑪</m:t>
-                        </m:r>
-                      </m:e>
-                      <m:sub>
-                        <m:r>
-                          <a:rPr lang="en-US" altLang="zh-TW" sz="2200" b="1" i="1" smtClean="0">
-                            <a:latin typeface="Cambria Math" panose="02040503050406030204" pitchFamily="18" charset="0"/>
-                          </a:rPr>
-                          <m:t>𝒊</m:t>
-                        </m:r>
-                      </m:sub>
-                    </m:sSub>
-                    <m:r>
-                      <a:rPr lang="en-US" altLang="zh-TW" sz="2200" b="1" i="1" smtClean="0">
-                        <a:latin typeface="Cambria Math" panose="02040503050406030204" pitchFamily="18" charset="0"/>
-                        <a:ea typeface="Cambria Math" panose="02040503050406030204" pitchFamily="18" charset="0"/>
-                      </a:rPr>
-                      <m:t>≥</m:t>
+                      <m:t>&gt;</m:t>
                     </m:r>
                     <m:sSubSup>
                       <m:sSubSupPr>
@@ -12405,7 +12419,7 @@
             </p:txBody>
           </p:sp>
         </mc:Choice>
-        <mc:Fallback xmlns="">
+        <mc:Fallback>
           <p:sp>
             <p:nvSpPr>
               <p:cNvPr id="52" name="內容版面配置區 2">
@@ -12430,7 +12444,7 @@
               <a:blipFill>
                 <a:blip r:embed="rId3"/>
                 <a:stretch>
-                  <a:fillRect l="-655" t="-2752" b="-2752"/>
+                  <a:fillRect l="-655" t="-2752" b="-3670"/>
                 </a:stretch>
               </a:blipFill>
             </p:spPr>

</xml_diff>